<commit_message>
Revert "Merge branch 'main' into 2023-02-2/juarammor"
This reverts commit b2cb775568e9def139aa367cc8961c0eeefd7533, reversing
changes made to ab64d2a548c6bbfdf9e0f2608afdf095266a0c63.
</commit_message>
<xml_diff>
--- a/Classes/WebDev-00-Introducción.pptx
+++ b/Classes/WebDev-00-Introducción.pptx
@@ -219,7 +219,7 @@
           <a:p>
             <a:fld id="{4DB897FE-AC85-4059-92E4-10C4313254ED}" type="datetimeFigureOut">
               <a:rPr lang="en-US" smtClean="0"/>
-              <a:t>8/21/2023</a:t>
+              <a:t>2/1/2022</a:t>
             </a:fld>
             <a:endParaRPr lang="en-US"/>
           </a:p>
@@ -283,37 +283,38 @@
           <a:p>
             <a:pPr lvl="0"/>
             <a:r>
-              <a:rPr lang="en-US"/>
+              <a:rPr lang="en-US" smtClean="0"/>
               <a:t>Click to edit Master text styles</a:t>
             </a:r>
           </a:p>
           <a:p>
             <a:pPr lvl="1"/>
             <a:r>
-              <a:rPr lang="en-US"/>
+              <a:rPr lang="en-US" smtClean="0"/>
               <a:t>Second level</a:t>
             </a:r>
           </a:p>
           <a:p>
             <a:pPr lvl="2"/>
             <a:r>
-              <a:rPr lang="en-US"/>
+              <a:rPr lang="en-US" smtClean="0"/>
               <a:t>Third level</a:t>
             </a:r>
           </a:p>
           <a:p>
             <a:pPr lvl="3"/>
             <a:r>
-              <a:rPr lang="en-US"/>
+              <a:rPr lang="en-US" smtClean="0"/>
               <a:t>Fourth level</a:t>
             </a:r>
           </a:p>
           <a:p>
             <a:pPr lvl="4"/>
             <a:r>
-              <a:rPr lang="en-US"/>
+              <a:rPr lang="en-US" smtClean="0"/>
               <a:t>Fifth level</a:t>
             </a:r>
+            <a:endParaRPr lang="en-US"/>
           </a:p>
         </p:txBody>
       </p:sp>
@@ -619,31 +620,31 @@
               <a:buChar char="-"/>
             </a:pPr>
             <a:r>
-              <a:rPr lang="en-US" dirty="0"/>
+              <a:rPr lang="en-US" dirty="0" smtClean="0"/>
               <a:t>WEB </a:t>
             </a:r>
             <a:r>
-              <a:rPr lang="en-US" dirty="0" err="1"/>
+              <a:rPr lang="en-US" dirty="0" err="1" smtClean="0"/>
               <a:t>es</a:t>
             </a:r>
             <a:r>
-              <a:rPr lang="en-US" dirty="0"/>
+              <a:rPr lang="en-US" dirty="0" smtClean="0"/>
               <a:t> lo que se </a:t>
             </a:r>
             <a:r>
-              <a:rPr lang="en-US" dirty="0" err="1"/>
+              <a:rPr lang="en-US" dirty="0" err="1" smtClean="0"/>
               <a:t>publica</a:t>
             </a:r>
             <a:r>
-              <a:rPr lang="en-US" dirty="0"/>
+              <a:rPr lang="en-US" dirty="0" smtClean="0"/>
               <a:t> </a:t>
             </a:r>
             <a:r>
-              <a:rPr lang="en-US" dirty="0" err="1"/>
+              <a:rPr lang="en-US" dirty="0" err="1" smtClean="0"/>
               <a:t>utilizando</a:t>
             </a:r>
             <a:r>
-              <a:rPr lang="en-US" dirty="0"/>
+              <a:rPr lang="en-US" dirty="0" smtClean="0"/>
               <a:t> protocol HTTP </a:t>
             </a:r>
           </a:p>
@@ -653,83 +654,83 @@
               <a:buChar char="-"/>
             </a:pPr>
             <a:r>
-              <a:rPr lang="en-US" dirty="0" err="1"/>
+              <a:rPr lang="en-US" dirty="0" err="1" smtClean="0"/>
               <a:t>Aplicacion</a:t>
             </a:r>
             <a:r>
-              <a:rPr lang="en-US" baseline="0" dirty="0"/>
+              <a:rPr lang="en-US" baseline="0" dirty="0" smtClean="0"/>
               <a:t> Web: Una </a:t>
             </a:r>
             <a:r>
-              <a:rPr lang="en-US" baseline="0" dirty="0" err="1"/>
+              <a:rPr lang="en-US" baseline="0" dirty="0" err="1" smtClean="0"/>
               <a:t>aplicacion</a:t>
             </a:r>
             <a:r>
-              <a:rPr lang="en-US" baseline="0" dirty="0"/>
+              <a:rPr lang="en-US" baseline="0" dirty="0" smtClean="0"/>
               <a:t> , Sistema que </a:t>
             </a:r>
             <a:r>
-              <a:rPr lang="en-US" baseline="0" dirty="0" err="1"/>
+              <a:rPr lang="en-US" baseline="0" dirty="0" err="1" smtClean="0"/>
               <a:t>o</a:t>
             </a:r>
             <a:r>
-              <a:rPr lang="en-US" dirty="0" err="1"/>
+              <a:rPr lang="en-US" dirty="0" err="1" smtClean="0"/>
               <a:t>frece</a:t>
             </a:r>
             <a:r>
-              <a:rPr lang="en-US" dirty="0"/>
+              <a:rPr lang="en-US" dirty="0" smtClean="0"/>
               <a:t> </a:t>
             </a:r>
             <a:r>
-              <a:rPr lang="en-US" dirty="0" err="1"/>
+              <a:rPr lang="en-US" dirty="0" err="1" smtClean="0"/>
               <a:t>servicios</a:t>
             </a:r>
             <a:r>
-              <a:rPr lang="en-US" dirty="0"/>
+              <a:rPr lang="en-US" dirty="0" smtClean="0"/>
               <a:t> </a:t>
             </a:r>
             <a:r>
-              <a:rPr lang="en-US" dirty="0" err="1"/>
+              <a:rPr lang="en-US" dirty="0" err="1" smtClean="0"/>
               <a:t>sobre</a:t>
             </a:r>
             <a:r>
-              <a:rPr lang="en-US" dirty="0"/>
+              <a:rPr lang="en-US" dirty="0" smtClean="0"/>
               <a:t> internet o</a:t>
             </a:r>
             <a:r>
-              <a:rPr lang="en-US" baseline="0" dirty="0"/>
+              <a:rPr lang="en-US" baseline="0" dirty="0" smtClean="0"/>
               <a:t> intranet , </a:t>
             </a:r>
             <a:r>
-              <a:rPr lang="en-US" baseline="0" dirty="0" err="1"/>
+              <a:rPr lang="en-US" baseline="0" dirty="0" err="1" smtClean="0"/>
               <a:t>usando</a:t>
             </a:r>
             <a:r>
-              <a:rPr lang="en-US" baseline="0" dirty="0"/>
+              <a:rPr lang="en-US" baseline="0" dirty="0" smtClean="0"/>
               <a:t> </a:t>
             </a:r>
             <a:r>
-              <a:rPr lang="en-US" baseline="0" dirty="0" err="1"/>
+              <a:rPr lang="en-US" baseline="0" dirty="0" err="1" smtClean="0"/>
               <a:t>como</a:t>
             </a:r>
             <a:r>
-              <a:rPr lang="en-US" baseline="0" dirty="0"/>
+              <a:rPr lang="en-US" baseline="0" dirty="0" smtClean="0"/>
               <a:t> </a:t>
             </a:r>
             <a:r>
-              <a:rPr lang="en-US" baseline="0" dirty="0" err="1"/>
+              <a:rPr lang="en-US" baseline="0" dirty="0" err="1" smtClean="0"/>
               <a:t>medio</a:t>
             </a:r>
             <a:r>
-              <a:rPr lang="en-US" baseline="0" dirty="0"/>
+              <a:rPr lang="en-US" baseline="0" dirty="0" smtClean="0"/>
               <a:t> de </a:t>
             </a:r>
             <a:r>
-              <a:rPr lang="en-US" baseline="0" dirty="0" err="1"/>
+              <a:rPr lang="en-US" baseline="0" dirty="0" err="1" smtClean="0"/>
               <a:t>transporte</a:t>
             </a:r>
             <a:r>
-              <a:rPr lang="en-US" baseline="0" dirty="0"/>
+              <a:rPr lang="en-US" baseline="0" dirty="0" smtClean="0"/>
               <a:t> el protocol HTTP</a:t>
             </a:r>
           </a:p>
@@ -739,127 +740,127 @@
               <a:buChar char="-"/>
             </a:pPr>
             <a:r>
-              <a:rPr lang="en-US" baseline="0" dirty="0"/>
+              <a:rPr lang="en-US" baseline="0" dirty="0" smtClean="0"/>
               <a:t>Una </a:t>
             </a:r>
             <a:r>
-              <a:rPr lang="en-US" baseline="0" dirty="0" err="1"/>
+              <a:rPr lang="en-US" baseline="0" dirty="0" err="1" smtClean="0"/>
               <a:t>aplicacion</a:t>
             </a:r>
             <a:r>
-              <a:rPr lang="en-US" baseline="0" dirty="0"/>
+              <a:rPr lang="en-US" baseline="0" dirty="0" smtClean="0"/>
               <a:t> </a:t>
             </a:r>
             <a:r>
-              <a:rPr lang="en-US" baseline="0" dirty="0" err="1"/>
+              <a:rPr lang="en-US" baseline="0" dirty="0" err="1" smtClean="0"/>
               <a:t>Cliente</a:t>
             </a:r>
             <a:r>
-              <a:rPr lang="en-US" baseline="0" dirty="0"/>
+              <a:rPr lang="en-US" baseline="0" dirty="0" smtClean="0"/>
               <a:t> </a:t>
             </a:r>
             <a:r>
-              <a:rPr lang="en-US" baseline="0" dirty="0" err="1"/>
+              <a:rPr lang="en-US" baseline="0" dirty="0" err="1" smtClean="0"/>
               <a:t>servidor</a:t>
             </a:r>
             <a:r>
-              <a:rPr lang="en-US" baseline="0" dirty="0"/>
+              <a:rPr lang="en-US" baseline="0" dirty="0" smtClean="0"/>
               <a:t> no </a:t>
             </a:r>
             <a:r>
-              <a:rPr lang="en-US" baseline="0" dirty="0" err="1"/>
+              <a:rPr lang="en-US" baseline="0" dirty="0" err="1" smtClean="0"/>
               <a:t>necesariamente</a:t>
             </a:r>
             <a:r>
-              <a:rPr lang="en-US" baseline="0" dirty="0"/>
+              <a:rPr lang="en-US" baseline="0" dirty="0" smtClean="0"/>
               <a:t> </a:t>
             </a:r>
             <a:r>
-              <a:rPr lang="en-US" baseline="0" dirty="0" err="1"/>
+              <a:rPr lang="en-US" baseline="0" dirty="0" err="1" smtClean="0"/>
               <a:t>en</a:t>
             </a:r>
             <a:r>
-              <a:rPr lang="en-US" baseline="0" dirty="0"/>
+              <a:rPr lang="en-US" baseline="0" dirty="0" smtClean="0"/>
               <a:t> WEB, </a:t>
             </a:r>
             <a:r>
-              <a:rPr lang="en-US" baseline="0" dirty="0" err="1"/>
+              <a:rPr lang="en-US" baseline="0" dirty="0" err="1" smtClean="0"/>
               <a:t>pero</a:t>
             </a:r>
             <a:r>
-              <a:rPr lang="en-US" baseline="0" dirty="0"/>
+              <a:rPr lang="en-US" baseline="0" dirty="0" smtClean="0"/>
               <a:t> </a:t>
             </a:r>
             <a:r>
-              <a:rPr lang="en-US" baseline="0" dirty="0" err="1"/>
+              <a:rPr lang="en-US" baseline="0" dirty="0" err="1" smtClean="0"/>
               <a:t>una</a:t>
             </a:r>
             <a:r>
-              <a:rPr lang="en-US" baseline="0" dirty="0"/>
+              <a:rPr lang="en-US" baseline="0" dirty="0" smtClean="0"/>
               <a:t> </a:t>
             </a:r>
             <a:r>
-              <a:rPr lang="en-US" baseline="0" dirty="0" err="1"/>
+              <a:rPr lang="en-US" baseline="0" dirty="0" err="1" smtClean="0"/>
               <a:t>aplicacion</a:t>
             </a:r>
             <a:r>
-              <a:rPr lang="en-US" baseline="0" dirty="0"/>
+              <a:rPr lang="en-US" baseline="0" dirty="0" smtClean="0"/>
               <a:t> Web </a:t>
             </a:r>
             <a:r>
-              <a:rPr lang="en-US" baseline="0" dirty="0" err="1"/>
+              <a:rPr lang="en-US" baseline="0" dirty="0" err="1" smtClean="0"/>
               <a:t>si</a:t>
             </a:r>
             <a:r>
-              <a:rPr lang="en-US" baseline="0" dirty="0"/>
+              <a:rPr lang="en-US" baseline="0" dirty="0" smtClean="0"/>
               <a:t> </a:t>
             </a:r>
             <a:r>
-              <a:rPr lang="en-US" baseline="0" dirty="0" err="1"/>
+              <a:rPr lang="en-US" baseline="0" dirty="0" err="1" smtClean="0"/>
               <a:t>podria</a:t>
             </a:r>
             <a:r>
-              <a:rPr lang="en-US" baseline="0" dirty="0"/>
+              <a:rPr lang="en-US" baseline="0" dirty="0" smtClean="0"/>
               <a:t> </a:t>
             </a:r>
             <a:r>
-              <a:rPr lang="en-US" baseline="0" dirty="0" err="1"/>
+              <a:rPr lang="en-US" baseline="0" dirty="0" err="1" smtClean="0"/>
               <a:t>er</a:t>
             </a:r>
             <a:r>
-              <a:rPr lang="en-US" baseline="0" dirty="0"/>
+              <a:rPr lang="en-US" baseline="0" dirty="0" smtClean="0"/>
               <a:t> similar a </a:t>
             </a:r>
             <a:r>
-              <a:rPr lang="en-US" baseline="0" dirty="0" err="1"/>
+              <a:rPr lang="en-US" baseline="0" dirty="0" err="1" smtClean="0"/>
               <a:t>una</a:t>
             </a:r>
             <a:r>
-              <a:rPr lang="en-US" baseline="0" dirty="0"/>
+              <a:rPr lang="en-US" baseline="0" dirty="0" smtClean="0"/>
               <a:t> </a:t>
             </a:r>
             <a:r>
-              <a:rPr lang="en-US" baseline="0" dirty="0" err="1"/>
+              <a:rPr lang="en-US" baseline="0" dirty="0" err="1" smtClean="0"/>
               <a:t>aplicacion</a:t>
             </a:r>
             <a:r>
-              <a:rPr lang="en-US" baseline="0" dirty="0"/>
+              <a:rPr lang="en-US" baseline="0" dirty="0" smtClean="0"/>
               <a:t> </a:t>
             </a:r>
             <a:r>
-              <a:rPr lang="en-US" baseline="0" dirty="0" err="1"/>
+              <a:rPr lang="en-US" baseline="0" dirty="0" err="1" smtClean="0"/>
               <a:t>Cliente</a:t>
             </a:r>
             <a:r>
-              <a:rPr lang="en-US" baseline="0" dirty="0"/>
+              <a:rPr lang="en-US" baseline="0" dirty="0" smtClean="0"/>
               <a:t> </a:t>
             </a:r>
             <a:r>
-              <a:rPr lang="en-US" baseline="0" dirty="0" err="1"/>
+              <a:rPr lang="en-US" baseline="0" dirty="0" err="1" smtClean="0"/>
               <a:t>servidor</a:t>
             </a:r>
             <a:r>
-              <a:rPr lang="en-US" baseline="0" dirty="0"/>
+              <a:rPr lang="en-US" baseline="0" dirty="0" smtClean="0"/>
               <a:t>.</a:t>
             </a:r>
           </a:p>
@@ -869,71 +870,71 @@
               <a:buChar char="-"/>
             </a:pPr>
             <a:r>
-              <a:rPr lang="en-US" baseline="0" dirty="0"/>
+              <a:rPr lang="en-US" baseline="0" dirty="0" smtClean="0"/>
               <a:t>Una Intranet </a:t>
             </a:r>
             <a:r>
-              <a:rPr lang="en-US" baseline="0" dirty="0" err="1"/>
+              <a:rPr lang="en-US" baseline="0" dirty="0" err="1" smtClean="0"/>
               <a:t>despliega</a:t>
             </a:r>
             <a:r>
-              <a:rPr lang="en-US" baseline="0" dirty="0"/>
+              <a:rPr lang="en-US" baseline="0" dirty="0" smtClean="0"/>
               <a:t> </a:t>
             </a:r>
             <a:r>
-              <a:rPr lang="en-US" baseline="0" dirty="0" err="1"/>
+              <a:rPr lang="en-US" baseline="0" dirty="0" err="1" smtClean="0"/>
               <a:t>sus</a:t>
             </a:r>
             <a:r>
-              <a:rPr lang="en-US" baseline="0" dirty="0"/>
+              <a:rPr lang="en-US" baseline="0" dirty="0" smtClean="0"/>
               <a:t> </a:t>
             </a:r>
             <a:r>
-              <a:rPr lang="en-US" baseline="0" dirty="0" err="1"/>
+              <a:rPr lang="en-US" baseline="0" dirty="0" err="1" smtClean="0"/>
               <a:t>servicios</a:t>
             </a:r>
             <a:r>
-              <a:rPr lang="en-US" baseline="0" dirty="0"/>
+              <a:rPr lang="en-US" baseline="0" dirty="0" smtClean="0"/>
               <a:t> </a:t>
             </a:r>
             <a:r>
-              <a:rPr lang="en-US" baseline="0" dirty="0" err="1"/>
+              <a:rPr lang="en-US" baseline="0" dirty="0" err="1" smtClean="0"/>
               <a:t>dentro</a:t>
             </a:r>
             <a:r>
-              <a:rPr lang="en-US" baseline="0" dirty="0"/>
+              <a:rPr lang="en-US" baseline="0" dirty="0" smtClean="0"/>
               <a:t> de </a:t>
             </a:r>
             <a:r>
-              <a:rPr lang="en-US" baseline="0" dirty="0" err="1"/>
+              <a:rPr lang="en-US" baseline="0" dirty="0" err="1" smtClean="0"/>
               <a:t>una</a:t>
             </a:r>
             <a:r>
-              <a:rPr lang="en-US" baseline="0" dirty="0"/>
+              <a:rPr lang="en-US" baseline="0" dirty="0" smtClean="0"/>
               <a:t> red local, </a:t>
             </a:r>
             <a:r>
-              <a:rPr lang="en-US" baseline="0" dirty="0" err="1"/>
+              <a:rPr lang="en-US" baseline="0" dirty="0" err="1" smtClean="0"/>
               <a:t>pero</a:t>
             </a:r>
             <a:r>
-              <a:rPr lang="en-US" baseline="0" dirty="0"/>
+              <a:rPr lang="en-US" baseline="0" dirty="0" smtClean="0"/>
               <a:t> </a:t>
             </a:r>
             <a:r>
-              <a:rPr lang="en-US" baseline="0" dirty="0" err="1"/>
+              <a:rPr lang="en-US" baseline="0" dirty="0" err="1" smtClean="0"/>
               <a:t>usando</a:t>
             </a:r>
             <a:r>
-              <a:rPr lang="en-US" baseline="0" dirty="0"/>
+              <a:rPr lang="en-US" baseline="0" dirty="0" smtClean="0"/>
               <a:t> </a:t>
             </a:r>
             <a:r>
-              <a:rPr lang="en-US" baseline="0" dirty="0" err="1"/>
+              <a:rPr lang="en-US" baseline="0" dirty="0" err="1" smtClean="0"/>
               <a:t>servicios</a:t>
             </a:r>
             <a:r>
-              <a:rPr lang="en-US" baseline="0" dirty="0"/>
+              <a:rPr lang="en-US" baseline="0" dirty="0" smtClean="0"/>
               <a:t> Web </a:t>
             </a:r>
           </a:p>
@@ -943,11 +944,11 @@
               <a:buChar char="-"/>
             </a:pPr>
             <a:r>
-              <a:rPr lang="en-US" baseline="0" dirty="0"/>
+              <a:rPr lang="en-US" baseline="0" dirty="0" smtClean="0"/>
               <a:t>Un </a:t>
             </a:r>
             <a:r>
-              <a:rPr lang="es-ES" sz="1200" b="0" i="0" kern="1200" dirty="0">
+              <a:rPr lang="es-ES" sz="1200" b="0" i="0" kern="1200" dirty="0" smtClean="0">
                 <a:solidFill>
                   <a:schemeClr val="tx1"/>
                 </a:solidFill>
@@ -978,97 +979,97 @@
               <a:defRPr/>
             </a:pPr>
             <a:r>
-              <a:rPr lang="en-US" baseline="0" dirty="0"/>
+              <a:rPr lang="en-US" baseline="0" dirty="0" smtClean="0"/>
               <a:t>Un Portal Web </a:t>
             </a:r>
             <a:r>
-              <a:rPr lang="en-US" baseline="0" dirty="0" err="1"/>
+              <a:rPr lang="en-US" baseline="0" dirty="0" err="1" smtClean="0"/>
               <a:t>es</a:t>
             </a:r>
             <a:r>
-              <a:rPr lang="en-US" baseline="0" dirty="0"/>
+              <a:rPr lang="en-US" baseline="0" dirty="0" smtClean="0"/>
               <a:t> el </a:t>
             </a:r>
             <a:r>
-              <a:rPr lang="en-US" baseline="0" dirty="0" err="1"/>
+              <a:rPr lang="en-US" baseline="0" dirty="0" err="1" smtClean="0"/>
               <a:t>conjunto</a:t>
             </a:r>
             <a:r>
-              <a:rPr lang="en-US" baseline="0" dirty="0"/>
+              <a:rPr lang="en-US" baseline="0" dirty="0" smtClean="0"/>
               <a:t> de multiples </a:t>
             </a:r>
             <a:r>
-              <a:rPr lang="en-US" baseline="0" dirty="0" err="1"/>
+              <a:rPr lang="en-US" baseline="0" dirty="0" err="1" smtClean="0"/>
               <a:t>servicios</a:t>
             </a:r>
             <a:r>
-              <a:rPr lang="en-US" baseline="0" dirty="0"/>
+              <a:rPr lang="en-US" baseline="0" dirty="0" smtClean="0"/>
               <a:t> </a:t>
             </a:r>
             <a:r>
-              <a:rPr lang="en-US" baseline="0" dirty="0" err="1"/>
+              <a:rPr lang="en-US" baseline="0" dirty="0" err="1" smtClean="0"/>
               <a:t>pra</a:t>
             </a:r>
             <a:r>
-              <a:rPr lang="en-US" baseline="0" dirty="0"/>
+              <a:rPr lang="en-US" baseline="0" dirty="0" smtClean="0"/>
               <a:t> </a:t>
             </a:r>
             <a:r>
-              <a:rPr lang="en-US" baseline="0" dirty="0" err="1"/>
+              <a:rPr lang="en-US" baseline="0" dirty="0" err="1" smtClean="0"/>
               <a:t>una</a:t>
             </a:r>
             <a:r>
-              <a:rPr lang="en-US" baseline="0" dirty="0"/>
+              <a:rPr lang="en-US" baseline="0" dirty="0" smtClean="0"/>
               <a:t> </a:t>
             </a:r>
             <a:r>
-              <a:rPr lang="en-US" baseline="0" dirty="0" err="1"/>
+              <a:rPr lang="en-US" baseline="0" dirty="0" err="1" smtClean="0"/>
               <a:t>audiencia</a:t>
             </a:r>
             <a:r>
-              <a:rPr lang="en-US" baseline="0" dirty="0"/>
+              <a:rPr lang="en-US" baseline="0" dirty="0" smtClean="0"/>
               <a:t> </a:t>
             </a:r>
             <a:r>
-              <a:rPr lang="en-US" baseline="0" dirty="0" err="1"/>
+              <a:rPr lang="en-US" baseline="0" dirty="0" err="1" smtClean="0"/>
               <a:t>en</a:t>
             </a:r>
             <a:r>
-              <a:rPr lang="en-US" baseline="0" dirty="0"/>
+              <a:rPr lang="en-US" baseline="0" dirty="0" smtClean="0"/>
               <a:t> particular que se </a:t>
             </a:r>
             <a:r>
-              <a:rPr lang="en-US" baseline="0" dirty="0" err="1"/>
+              <a:rPr lang="en-US" baseline="0" dirty="0" err="1" smtClean="0"/>
               <a:t>consolidad</a:t>
             </a:r>
             <a:r>
-              <a:rPr lang="en-US" baseline="0" dirty="0"/>
+              <a:rPr lang="en-US" baseline="0" dirty="0" smtClean="0"/>
               <a:t> </a:t>
             </a:r>
             <a:r>
-              <a:rPr lang="en-US" baseline="0" dirty="0" err="1"/>
+              <a:rPr lang="en-US" baseline="0" dirty="0" err="1" smtClean="0"/>
               <a:t>en</a:t>
             </a:r>
             <a:r>
-              <a:rPr lang="en-US" baseline="0" dirty="0"/>
+              <a:rPr lang="en-US" baseline="0" dirty="0" smtClean="0"/>
               <a:t> solo </a:t>
             </a:r>
             <a:r>
-              <a:rPr lang="en-US" baseline="0" dirty="0" err="1"/>
+              <a:rPr lang="en-US" baseline="0" dirty="0" err="1" smtClean="0"/>
               <a:t>sitio</a:t>
             </a:r>
             <a:r>
-              <a:rPr lang="en-US" baseline="0" dirty="0"/>
+              <a:rPr lang="en-US" baseline="0" dirty="0" smtClean="0"/>
               <a:t> web.</a:t>
             </a:r>
-            <a:endParaRPr lang="en-US" dirty="0"/>
+            <a:endParaRPr lang="en-US" dirty="0" smtClean="0"/>
           </a:p>
           <a:p>
             <a:pPr marL="0" indent="0">
               <a:buFontTx/>
               <a:buNone/>
             </a:pPr>
-            <a:endParaRPr lang="en-US" baseline="0" dirty="0"/>
+            <a:endParaRPr lang="en-US" baseline="0" dirty="0" smtClean="0"/>
           </a:p>
           <a:p>
             <a:pPr marL="0" indent="0">
@@ -1076,7 +1077,7 @@
               <a:buNone/>
             </a:pPr>
             <a:r>
-              <a:rPr lang="en-US" b="1" baseline="0" dirty="0"/>
+              <a:rPr lang="en-US" b="1" baseline="0" dirty="0" smtClean="0"/>
               <a:t>WEB</a:t>
             </a:r>
           </a:p>
@@ -1086,7 +1087,7 @@
               <a:buNone/>
             </a:pPr>
             <a:r>
-              <a:rPr lang="en-US" baseline="0" dirty="0"/>
+              <a:rPr lang="en-US" baseline="0" dirty="0" smtClean="0"/>
               <a:t>https://www.significados.com/web/</a:t>
             </a:r>
           </a:p>
@@ -1095,7 +1096,7 @@
               <a:buFontTx/>
               <a:buNone/>
             </a:pPr>
-            <a:endParaRPr lang="en-US" baseline="0" dirty="0"/>
+            <a:endParaRPr lang="en-US" baseline="0" dirty="0" smtClean="0"/>
           </a:p>
           <a:p>
             <a:pPr marL="0" indent="0">
@@ -1103,7 +1104,7 @@
               <a:buNone/>
             </a:pPr>
             <a:r>
-              <a:rPr lang="es-ES" sz="1200" b="0" i="0" kern="1200" dirty="0">
+              <a:rPr lang="es-ES" sz="1200" b="0" i="0" kern="1200" dirty="0" smtClean="0">
                 <a:solidFill>
                   <a:schemeClr val="tx1"/>
                 </a:solidFill>
@@ -1115,7 +1116,7 @@
               <a:t>La web es el </a:t>
             </a:r>
             <a:r>
-              <a:rPr lang="es-ES" sz="1200" b="1" i="0" kern="1200" dirty="0">
+              <a:rPr lang="es-ES" sz="1200" b="1" i="0" kern="1200" dirty="0" smtClean="0">
                 <a:solidFill>
                   <a:schemeClr val="tx1"/>
                 </a:solidFill>
@@ -1127,7 +1128,7 @@
               <a:t>diminutivo de </a:t>
             </a:r>
             <a:r>
-              <a:rPr lang="es-ES" sz="1200" b="1" i="1" kern="1200" dirty="0" err="1">
+              <a:rPr lang="es-ES" sz="1200" b="1" i="1" kern="1200" dirty="0" err="1" smtClean="0">
                 <a:solidFill>
                   <a:schemeClr val="tx1"/>
                 </a:solidFill>
@@ -1139,7 +1140,7 @@
               <a:t>world</a:t>
             </a:r>
             <a:r>
-              <a:rPr lang="es-ES" sz="1200" b="1" i="1" kern="1200" dirty="0">
+              <a:rPr lang="es-ES" sz="1200" b="1" i="1" kern="1200" dirty="0" smtClean="0">
                 <a:solidFill>
                   <a:schemeClr val="tx1"/>
                 </a:solidFill>
@@ -1151,7 +1152,7 @@
               <a:t> </a:t>
             </a:r>
             <a:r>
-              <a:rPr lang="es-ES" sz="1200" b="1" i="1" kern="1200" dirty="0" err="1">
+              <a:rPr lang="es-ES" sz="1200" b="1" i="1" kern="1200" dirty="0" err="1" smtClean="0">
                 <a:solidFill>
                   <a:schemeClr val="tx1"/>
                 </a:solidFill>
@@ -1163,7 +1164,7 @@
               <a:t>wide</a:t>
             </a:r>
             <a:r>
-              <a:rPr lang="es-ES" sz="1200" b="1" i="1" kern="1200" dirty="0">
+              <a:rPr lang="es-ES" sz="1200" b="1" i="1" kern="1200" dirty="0" smtClean="0">
                 <a:solidFill>
                   <a:schemeClr val="tx1"/>
                 </a:solidFill>
@@ -1175,7 +1176,7 @@
               <a:t> web</a:t>
             </a:r>
             <a:r>
-              <a:rPr lang="es-ES" sz="1200" b="1" i="0" kern="1200" dirty="0">
+              <a:rPr lang="es-ES" sz="1200" b="1" i="0" kern="1200" dirty="0" smtClean="0">
                 <a:solidFill>
                   <a:schemeClr val="tx1"/>
                 </a:solidFill>
@@ -1187,7 +1188,7 @@
               <a:t> o www</a:t>
             </a:r>
             <a:r>
-              <a:rPr lang="es-ES" sz="1200" b="0" i="0" kern="1200" dirty="0">
+              <a:rPr lang="es-ES" sz="1200" b="0" i="0" kern="1200" dirty="0" smtClean="0">
                 <a:solidFill>
                   <a:schemeClr val="tx1"/>
                 </a:solidFill>
@@ -1199,7 +1200,7 @@
               <a:t> cuyas tecnologías para su funcionamiento (HTML, URL, HTTP) fueron desarrolladas en el año 1990 por Tim </a:t>
             </a:r>
             <a:r>
-              <a:rPr lang="es-ES" sz="1200" b="0" i="0" kern="1200" dirty="0" err="1">
+              <a:rPr lang="es-ES" sz="1200" b="0" i="0" kern="1200" dirty="0" err="1" smtClean="0">
                 <a:solidFill>
                   <a:schemeClr val="tx1"/>
                 </a:solidFill>
@@ -1211,7 +1212,7 @@
               <a:t>Berners</a:t>
             </a:r>
             <a:r>
-              <a:rPr lang="es-ES" sz="1200" b="0" i="0" kern="1200" dirty="0">
+              <a:rPr lang="es-ES" sz="1200" b="0" i="0" kern="1200" dirty="0" smtClean="0">
                 <a:solidFill>
                   <a:schemeClr val="tx1"/>
                 </a:solidFill>
@@ -1222,14 +1223,14 @@
               </a:rPr>
               <a:t> Lee.</a:t>
             </a:r>
-            <a:endParaRPr lang="en-US" baseline="0" dirty="0"/>
+            <a:endParaRPr lang="en-US" baseline="0" dirty="0" smtClean="0"/>
           </a:p>
           <a:p>
             <a:pPr marL="0" indent="0">
               <a:buFontTx/>
               <a:buNone/>
             </a:pPr>
-            <a:endParaRPr lang="en-US" baseline="0" dirty="0"/>
+            <a:endParaRPr lang="en-US" baseline="0" dirty="0" smtClean="0"/>
           </a:p>
           <a:p>
             <a:pPr marL="0" indent="0">
@@ -1237,7 +1238,7 @@
               <a:buNone/>
             </a:pPr>
             <a:r>
-              <a:rPr lang="es-ES" b="1" baseline="0" dirty="0"/>
+              <a:rPr lang="es-ES" b="1" baseline="0" dirty="0" smtClean="0"/>
               <a:t>¿Qué es un Sitio Web?</a:t>
             </a:r>
           </a:p>
@@ -1247,7 +1248,7 @@
               <a:buNone/>
             </a:pPr>
             <a:r>
-              <a:rPr lang="es-ES" baseline="0" dirty="0"/>
+              <a:rPr lang="es-ES" baseline="0" dirty="0" smtClean="0"/>
               <a:t>https://upanama.e-ducativa.com/archivos/repositorio/6000/6126/html/3_qu_es_.htm </a:t>
             </a:r>
           </a:p>
@@ -1256,7 +1257,7 @@
               <a:buFontTx/>
               <a:buNone/>
             </a:pPr>
-            <a:endParaRPr lang="es-ES" baseline="0" dirty="0"/>
+            <a:endParaRPr lang="es-ES" baseline="0" dirty="0" smtClean="0"/>
           </a:p>
           <a:p>
             <a:pPr marL="0" indent="0">
@@ -1264,7 +1265,7 @@
               <a:buNone/>
             </a:pPr>
             <a:r>
-              <a:rPr lang="es-ES" b="1" baseline="0" dirty="0"/>
+              <a:rPr lang="es-ES" b="1" baseline="0" dirty="0" smtClean="0"/>
               <a:t>¿Qué es un Portal Web?</a:t>
             </a:r>
           </a:p>
@@ -1274,7 +1275,7 @@
               <a:buNone/>
             </a:pPr>
             <a:r>
-              <a:rPr lang="es-ES" baseline="0" dirty="0"/>
+              <a:rPr lang="es-ES" baseline="0" dirty="0" smtClean="0"/>
               <a:t>https://www.liferay.com/es/resources/l/web-portal</a:t>
             </a:r>
           </a:p>
@@ -1283,7 +1284,7 @@
               <a:buFontTx/>
               <a:buNone/>
             </a:pPr>
-            <a:endParaRPr lang="es-ES" baseline="0" dirty="0"/>
+            <a:endParaRPr lang="es-ES" baseline="0" dirty="0" smtClean="0"/>
           </a:p>
           <a:p>
             <a:pPr marL="0" indent="0">
@@ -1291,7 +1292,7 @@
               <a:buNone/>
             </a:pPr>
             <a:r>
-              <a:rPr lang="es-ES" b="1" baseline="0" dirty="0"/>
+              <a:rPr lang="es-ES" b="1" baseline="0" dirty="0" smtClean="0"/>
               <a:t>Diferencia entre sitio web y portal</a:t>
             </a:r>
           </a:p>
@@ -1301,7 +1302,7 @@
               <a:buNone/>
             </a:pPr>
             <a:r>
-              <a:rPr lang="es-ES" baseline="0" dirty="0"/>
+              <a:rPr lang="es-ES" baseline="0" dirty="0" smtClean="0"/>
               <a:t>https://diferenciario.com/sitio-web-y-portal/</a:t>
             </a:r>
           </a:p>
@@ -1311,7 +1312,7 @@
               <a:buNone/>
             </a:pPr>
             <a:r>
-              <a:rPr lang="es-ES" baseline="0" dirty="0"/>
+              <a:rPr lang="es-ES" baseline="0" dirty="0" smtClean="0"/>
               <a:t>https://es.gadget-info.com/difference-between-website</a:t>
             </a:r>
           </a:p>
@@ -1398,19 +1399,19 @@
           <a:lstStyle/>
           <a:p>
             <a:r>
-              <a:rPr lang="es-ES" dirty="0"/>
+              <a:rPr lang="es-ES" dirty="0" smtClean="0"/>
               <a:t>¿Qué es el desarrollo web?</a:t>
             </a:r>
           </a:p>
           <a:p>
             <a:r>
-              <a:rPr lang="es-ES" dirty="0"/>
+              <a:rPr lang="es-ES" dirty="0" smtClean="0"/>
               <a:t>https://blog.openclassrooms.com/es/2017/09/11/que-es-el-desarrollo-web/</a:t>
             </a:r>
           </a:p>
           <a:p>
             <a:r>
-              <a:rPr lang="es-ES" dirty="0"/>
+              <a:rPr lang="es-ES" dirty="0" smtClean="0"/>
               <a:t>https://es.wikipedia.org/wiki/Desarrollo_web</a:t>
             </a:r>
             <a:endParaRPr lang="en-US" dirty="0"/>
@@ -1502,7 +1503,7 @@
               <a:buChar char="-"/>
             </a:pPr>
             <a:r>
-              <a:rPr lang="es-ES" sz="1200" b="0" i="0" kern="1200" dirty="0">
+              <a:rPr lang="es-ES" sz="1200" b="0" i="0" kern="1200" dirty="0" smtClean="0">
                 <a:solidFill>
                   <a:schemeClr val="tx1"/>
                 </a:solidFill>
@@ -1514,7 +1515,7 @@
               <a:t>Un desarrollador </a:t>
             </a:r>
             <a:r>
-              <a:rPr lang="es-ES" sz="1200" b="1" i="0" kern="1200" dirty="0" err="1">
+              <a:rPr lang="es-ES" sz="1200" b="1" i="0" kern="1200" dirty="0" err="1" smtClean="0">
                 <a:solidFill>
                   <a:schemeClr val="tx1"/>
                 </a:solidFill>
@@ -1526,7 +1527,7 @@
               <a:t>Frontend</a:t>
             </a:r>
             <a:r>
-              <a:rPr lang="es-ES" sz="1200" b="1" i="0" kern="1200" dirty="0">
+              <a:rPr lang="es-ES" sz="1200" b="1" i="0" kern="1200" dirty="0" smtClean="0">
                 <a:solidFill>
                   <a:schemeClr val="tx1"/>
                 </a:solidFill>
@@ -1538,7 +1539,7 @@
               <a:t> </a:t>
             </a:r>
             <a:r>
-              <a:rPr lang="es-ES" sz="1200" b="0" i="0" kern="1200" dirty="0">
+              <a:rPr lang="es-ES" sz="1200" b="0" i="0" kern="1200" dirty="0" smtClean="0">
                 <a:solidFill>
                   <a:schemeClr val="tx1"/>
                 </a:solidFill>
@@ -1550,7 +1551,7 @@
               <a:t>se encarga de la composición, diseño e interactividad usando HTML, CSS y JavaScript. El desarrollador </a:t>
             </a:r>
             <a:r>
-              <a:rPr lang="es-ES" sz="1200" b="0" i="0" kern="1200" dirty="0" err="1">
+              <a:rPr lang="es-ES" sz="1200" b="0" i="0" kern="1200" dirty="0" err="1" smtClean="0">
                 <a:solidFill>
                   <a:schemeClr val="tx1"/>
                 </a:solidFill>
@@ -1562,7 +1563,7 @@
               <a:t>Frontend</a:t>
             </a:r>
             <a:r>
-              <a:rPr lang="es-ES" sz="1200" b="0" i="0" kern="1200" dirty="0">
+              <a:rPr lang="es-ES" sz="1200" b="0" i="0" kern="1200" dirty="0" smtClean="0">
                 <a:solidFill>
                   <a:schemeClr val="tx1"/>
                 </a:solidFill>
@@ -1574,7 +1575,7 @@
               <a:t> toma una idea y la convierte en realidad. Lo que ves y lo que usas, como por ejemplo el aspecto visual del sitio web, los menús desplegables y el texto, son creados por el desarrollador </a:t>
             </a:r>
             <a:r>
-              <a:rPr lang="es-ES" sz="1200" b="0" i="0" kern="1200" dirty="0" err="1">
+              <a:rPr lang="es-ES" sz="1200" b="0" i="0" kern="1200" dirty="0" err="1" smtClean="0">
                 <a:solidFill>
                   <a:schemeClr val="tx1"/>
                 </a:solidFill>
@@ -1586,7 +1587,7 @@
               <a:t>Frontend</a:t>
             </a:r>
             <a:r>
-              <a:rPr lang="es-ES" sz="1200" b="0" i="0" kern="1200" dirty="0">
+              <a:rPr lang="es-ES" sz="1200" b="0" i="0" kern="1200" dirty="0" smtClean="0">
                 <a:solidFill>
                   <a:schemeClr val="tx1"/>
                 </a:solidFill>
@@ -1604,7 +1605,7 @@
               <a:buChar char="-"/>
             </a:pPr>
             <a:r>
-              <a:rPr lang="es-ES" sz="1200" b="0" i="0" kern="1200" dirty="0">
+              <a:rPr lang="es-ES" sz="1200" b="0" i="0" kern="1200" dirty="0" smtClean="0">
                 <a:solidFill>
                   <a:schemeClr val="tx1"/>
                 </a:solidFill>
@@ -1616,7 +1617,7 @@
               <a:t>El desarrollador </a:t>
             </a:r>
             <a:r>
-              <a:rPr lang="es-ES" sz="1200" b="1" i="0" kern="1200" dirty="0" err="1">
+              <a:rPr lang="es-ES" sz="1200" b="1" i="0" kern="1200" dirty="0" err="1" smtClean="0">
                 <a:solidFill>
                   <a:schemeClr val="tx1"/>
                 </a:solidFill>
@@ -1628,7 +1629,7 @@
               <a:t>Backend</a:t>
             </a:r>
             <a:r>
-              <a:rPr lang="es-ES" sz="1200" b="1" i="0" kern="1200" dirty="0">
+              <a:rPr lang="es-ES" sz="1200" b="1" i="0" kern="1200" dirty="0" smtClean="0">
                 <a:solidFill>
                   <a:schemeClr val="tx1"/>
                 </a:solidFill>
@@ -1640,7 +1641,7 @@
               <a:t> </a:t>
             </a:r>
             <a:r>
-              <a:rPr lang="es-ES" sz="1200" b="0" i="0" kern="1200" dirty="0">
+              <a:rPr lang="es-ES" sz="1200" b="0" i="0" kern="1200" dirty="0" smtClean="0">
                 <a:solidFill>
                   <a:schemeClr val="tx1"/>
                 </a:solidFill>
@@ -1652,7 +1653,7 @@
               <a:t>se encarga de lo que no se ve, es decir, dónde se almacenan los datos. Sin datos no hay </a:t>
             </a:r>
             <a:r>
-              <a:rPr lang="es-ES" sz="1200" b="0" i="0" kern="1200" dirty="0" err="1">
+              <a:rPr lang="es-ES" sz="1200" b="0" i="0" kern="1200" dirty="0" err="1" smtClean="0">
                 <a:solidFill>
                   <a:schemeClr val="tx1"/>
                 </a:solidFill>
@@ -1664,7 +1665,7 @@
               <a:t>Frontend</a:t>
             </a:r>
             <a:r>
-              <a:rPr lang="es-ES" sz="1200" b="0" i="0" kern="1200" dirty="0">
+              <a:rPr lang="es-ES" sz="1200" b="0" i="0" kern="1200" dirty="0" smtClean="0">
                 <a:solidFill>
                   <a:schemeClr val="tx1"/>
                 </a:solidFill>
@@ -1676,7 +1677,7 @@
               <a:t>. El </a:t>
             </a:r>
             <a:r>
-              <a:rPr lang="es-ES" sz="1200" b="0" i="0" kern="1200" dirty="0" err="1">
+              <a:rPr lang="es-ES" sz="1200" b="0" i="0" kern="1200" dirty="0" err="1" smtClean="0">
                 <a:solidFill>
                   <a:schemeClr val="tx1"/>
                 </a:solidFill>
@@ -1688,7 +1689,7 @@
               <a:t>Backend</a:t>
             </a:r>
             <a:r>
-              <a:rPr lang="es-ES" sz="1200" b="0" i="0" kern="1200" dirty="0">
+              <a:rPr lang="es-ES" sz="1200" b="0" i="0" kern="1200" dirty="0" smtClean="0">
                 <a:solidFill>
                   <a:schemeClr val="tx1"/>
                 </a:solidFill>
@@ -1700,7 +1701,7 @@
               <a:t> consiste en el servidor que acoge la web, una aplicación para ejecutarlo y una base de datos. El desarrollador </a:t>
             </a:r>
             <a:r>
-              <a:rPr lang="es-ES" sz="1200" b="0" i="0" kern="1200" dirty="0" err="1">
+              <a:rPr lang="es-ES" sz="1200" b="0" i="0" kern="1200" dirty="0" err="1" smtClean="0">
                 <a:solidFill>
                   <a:schemeClr val="tx1"/>
                 </a:solidFill>
@@ -1712,7 +1713,7 @@
               <a:t>Backend</a:t>
             </a:r>
             <a:r>
-              <a:rPr lang="es-ES" sz="1200" b="0" i="0" kern="1200" dirty="0">
+              <a:rPr lang="es-ES" sz="1200" b="0" i="0" kern="1200" dirty="0" smtClean="0">
                 <a:solidFill>
                   <a:schemeClr val="tx1"/>
                 </a:solidFill>
@@ -1730,7 +1731,7 @@
               <a:buChar char="-"/>
             </a:pPr>
             <a:r>
-              <a:rPr lang="es-ES" sz="1200" b="0" i="0" kern="1200" dirty="0">
+              <a:rPr lang="es-ES" sz="1200" b="0" i="0" kern="1200" dirty="0" smtClean="0">
                 <a:solidFill>
                   <a:schemeClr val="tx1"/>
                 </a:solidFill>
@@ -1742,7 +1743,7 @@
               <a:t>Si te interesan tanto el </a:t>
             </a:r>
             <a:r>
-              <a:rPr lang="es-ES" sz="1200" b="0" i="0" kern="1200" dirty="0" err="1">
+              <a:rPr lang="es-ES" sz="1200" b="0" i="0" kern="1200" dirty="0" err="1" smtClean="0">
                 <a:solidFill>
                   <a:schemeClr val="tx1"/>
                 </a:solidFill>
@@ -1754,7 +1755,7 @@
               <a:t>Frontend</a:t>
             </a:r>
             <a:r>
-              <a:rPr lang="es-ES" sz="1200" b="0" i="0" kern="1200" dirty="0">
+              <a:rPr lang="es-ES" sz="1200" b="0" i="0" kern="1200" dirty="0" smtClean="0">
                 <a:solidFill>
                   <a:schemeClr val="tx1"/>
                 </a:solidFill>
@@ -1766,7 +1767,7 @@
               <a:t> como el </a:t>
             </a:r>
             <a:r>
-              <a:rPr lang="es-ES" sz="1200" b="0" i="0" kern="1200" dirty="0" err="1">
+              <a:rPr lang="es-ES" sz="1200" b="0" i="0" kern="1200" dirty="0" err="1" smtClean="0">
                 <a:solidFill>
                   <a:schemeClr val="tx1"/>
                 </a:solidFill>
@@ -1778,7 +1779,7 @@
               <a:t>Backend</a:t>
             </a:r>
             <a:r>
-              <a:rPr lang="es-ES" sz="1200" b="0" i="0" kern="1200" dirty="0">
+              <a:rPr lang="es-ES" sz="1200" b="0" i="0" kern="1200" dirty="0" smtClean="0">
                 <a:solidFill>
                   <a:schemeClr val="tx1"/>
                 </a:solidFill>
@@ -1790,7 +1791,7 @@
               <a:t>, deberías plantearte convertirte en </a:t>
             </a:r>
             <a:r>
-              <a:rPr lang="es-ES" sz="1200" b="0" i="0" kern="1200" dirty="0" err="1">
+              <a:rPr lang="es-ES" sz="1200" b="0" i="0" kern="1200" dirty="0" err="1" smtClean="0">
                 <a:solidFill>
                   <a:schemeClr val="tx1"/>
                 </a:solidFill>
@@ -1802,7 +1803,7 @@
               <a:t>desarrollador·a</a:t>
             </a:r>
             <a:r>
-              <a:rPr lang="es-ES" sz="1200" b="0" i="0" kern="1200" dirty="0">
+              <a:rPr lang="es-ES" sz="1200" b="0" i="0" kern="1200" dirty="0" smtClean="0">
                 <a:solidFill>
                   <a:schemeClr val="tx1"/>
                 </a:solidFill>
@@ -1814,7 +1815,7 @@
               <a:t> </a:t>
             </a:r>
             <a:r>
-              <a:rPr lang="es-ES" sz="1200" b="1" i="0" kern="1200" dirty="0">
+              <a:rPr lang="es-ES" sz="1200" b="1" i="0" kern="1200" dirty="0" smtClean="0">
                 <a:solidFill>
                   <a:schemeClr val="tx1"/>
                 </a:solidFill>
@@ -1826,7 +1827,7 @@
               <a:t>Full-</a:t>
             </a:r>
             <a:r>
-              <a:rPr lang="es-ES" sz="1200" b="1" i="0" kern="1200" dirty="0" err="1">
+              <a:rPr lang="es-ES" sz="1200" b="1" i="0" kern="1200" dirty="0" err="1" smtClean="0">
                 <a:solidFill>
                   <a:schemeClr val="tx1"/>
                 </a:solidFill>
@@ -1838,7 +1839,7 @@
               <a:t>stack</a:t>
             </a:r>
             <a:r>
-              <a:rPr lang="es-ES" sz="1200" b="0" i="0" kern="1200" dirty="0">
+              <a:rPr lang="es-ES" sz="1200" b="0" i="0" kern="1200" dirty="0" smtClean="0">
                 <a:solidFill>
                   <a:schemeClr val="tx1"/>
                 </a:solidFill>
@@ -1850,7 +1851,7 @@
               <a:t>. El desarrollador Full-</a:t>
             </a:r>
             <a:r>
-              <a:rPr lang="es-ES" sz="1200" b="0" i="0" kern="1200" dirty="0" err="1">
+              <a:rPr lang="es-ES" sz="1200" b="0" i="0" kern="1200" dirty="0" err="1" smtClean="0">
                 <a:solidFill>
                   <a:schemeClr val="tx1"/>
                 </a:solidFill>
@@ -1862,7 +1863,7 @@
               <a:t>stack</a:t>
             </a:r>
             <a:r>
-              <a:rPr lang="es-ES" sz="1200" b="0" i="0" kern="1200" dirty="0">
+              <a:rPr lang="es-ES" sz="1200" b="0" i="0" kern="1200" dirty="0" smtClean="0">
                 <a:solidFill>
                   <a:schemeClr val="tx1"/>
                 </a:solidFill>
@@ -1874,7 +1875,7 @@
               <a:t> está a cargo tanto del </a:t>
             </a:r>
             <a:r>
-              <a:rPr lang="es-ES" sz="1200" b="0" i="0" kern="1200" dirty="0" err="1">
+              <a:rPr lang="es-ES" sz="1200" b="0" i="0" kern="1200" dirty="0" err="1" smtClean="0">
                 <a:solidFill>
                   <a:schemeClr val="tx1"/>
                 </a:solidFill>
@@ -1886,7 +1887,7 @@
               <a:t>Frontend</a:t>
             </a:r>
             <a:r>
-              <a:rPr lang="es-ES" sz="1200" b="0" i="0" kern="1200" dirty="0">
+              <a:rPr lang="es-ES" sz="1200" b="0" i="0" kern="1200" dirty="0" smtClean="0">
                 <a:solidFill>
                   <a:schemeClr val="tx1"/>
                 </a:solidFill>
@@ -1898,7 +1899,7 @@
               <a:t> como del </a:t>
             </a:r>
             <a:r>
-              <a:rPr lang="es-ES" sz="1200" b="0" i="0" kern="1200" dirty="0" err="1">
+              <a:rPr lang="es-ES" sz="1200" b="0" i="0" kern="1200" dirty="0" err="1" smtClean="0">
                 <a:solidFill>
                   <a:schemeClr val="tx1"/>
                 </a:solidFill>
@@ -1910,7 +1911,7 @@
               <a:t>Backend</a:t>
             </a:r>
             <a:r>
-              <a:rPr lang="es-ES" sz="1200" b="0" i="0" kern="1200" dirty="0">
+              <a:rPr lang="es-ES" sz="1200" b="0" i="0" kern="1200" dirty="0" smtClean="0">
                 <a:solidFill>
                   <a:schemeClr val="tx1"/>
                 </a:solidFill>
@@ -2080,7 +2081,7 @@
           </a:lstStyle>
           <a:p>
             <a:r>
-              <a:rPr lang="en-US"/>
+              <a:rPr lang="en-US" smtClean="0"/>
               <a:t>Click to edit Master title style</a:t>
             </a:r>
             <a:endParaRPr lang="es-CO"/>
@@ -2199,7 +2200,7 @@
           </a:lstStyle>
           <a:p>
             <a:r>
-              <a:rPr lang="en-US"/>
+              <a:rPr lang="en-US" smtClean="0"/>
               <a:t>Click to edit Master subtitle style</a:t>
             </a:r>
             <a:endParaRPr lang="es-CO"/>
@@ -2224,7 +2225,7 @@
             <a:fld id="{EE425855-FD75-467C-BECD-0927F9A0E82A}" type="datetimeFigureOut">
               <a:rPr lang="es-CO" smtClean="0"/>
               <a:pPr/>
-              <a:t>21/08/2023</a:t>
+              <a:t>1/02/2022</a:t>
             </a:fld>
             <a:endParaRPr lang="es-CO"/>
           </a:p>
@@ -2278,6 +2279,13 @@
   <p:clrMapOvr>
     <a:masterClrMapping/>
   </p:clrMapOvr>
+  <p:timing>
+    <p:tnLst>
+      <p:par>
+        <p:cTn id="1" dur="indefinite" restart="never" nodeType="tmRoot"/>
+      </p:par>
+    </p:tnLst>
+  </p:timing>
 </p:sldLayout>
 </file>
 
@@ -2398,7 +2406,7 @@
           </a:lstStyle>
           <a:p>
             <a:r>
-              <a:rPr lang="en-US"/>
+              <a:rPr lang="en-US" smtClean="0"/>
               <a:t>Click to edit Master title style</a:t>
             </a:r>
             <a:endParaRPr lang="es-CO"/>
@@ -2517,7 +2525,7 @@
           </a:lstStyle>
           <a:p>
             <a:r>
-              <a:rPr lang="en-US"/>
+              <a:rPr lang="en-US" smtClean="0"/>
               <a:t>Click to edit Master subtitle style</a:t>
             </a:r>
             <a:endParaRPr lang="es-CO"/>
@@ -2542,7 +2550,7 @@
             <a:fld id="{EE425855-FD75-467C-BECD-0927F9A0E82A}" type="datetimeFigureOut">
               <a:rPr lang="es-CO" smtClean="0"/>
               <a:pPr/>
-              <a:t>21/08/2023</a:t>
+              <a:t>1/02/2022</a:t>
             </a:fld>
             <a:endParaRPr lang="es-CO"/>
           </a:p>
@@ -2596,6 +2604,13 @@
   <p:clrMapOvr>
     <a:masterClrMapping/>
   </p:clrMapOvr>
+  <p:timing>
+    <p:tnLst>
+      <p:par>
+        <p:cTn id="1" dur="indefinite" restart="never" nodeType="tmRoot"/>
+      </p:par>
+    </p:tnLst>
+  </p:timing>
 </p:sldLayout>
 </file>
 
@@ -2696,7 +2711,7 @@
           <a:lstStyle/>
           <a:p>
             <a:r>
-              <a:rPr lang="en-US"/>
+              <a:rPr lang="en-US" smtClean="0"/>
               <a:t>Click to edit Master title style</a:t>
             </a:r>
             <a:endParaRPr lang="es-CO"/>
@@ -2720,35 +2735,35 @@
           <a:p>
             <a:pPr lvl="0"/>
             <a:r>
-              <a:rPr lang="en-US"/>
+              <a:rPr lang="en-US" smtClean="0"/>
               <a:t>Click to edit Master text styles</a:t>
             </a:r>
           </a:p>
           <a:p>
             <a:pPr lvl="1"/>
             <a:r>
-              <a:rPr lang="en-US"/>
+              <a:rPr lang="en-US" smtClean="0"/>
               <a:t>Second level</a:t>
             </a:r>
           </a:p>
           <a:p>
             <a:pPr lvl="2"/>
             <a:r>
-              <a:rPr lang="en-US"/>
+              <a:rPr lang="en-US" smtClean="0"/>
               <a:t>Third level</a:t>
             </a:r>
           </a:p>
           <a:p>
             <a:pPr lvl="3"/>
             <a:r>
-              <a:rPr lang="en-US"/>
+              <a:rPr lang="en-US" smtClean="0"/>
               <a:t>Fourth level</a:t>
             </a:r>
           </a:p>
           <a:p>
             <a:pPr lvl="4"/>
             <a:r>
-              <a:rPr lang="en-US"/>
+              <a:rPr lang="en-US" smtClean="0"/>
               <a:t>Fifth level</a:t>
             </a:r>
             <a:endParaRPr lang="es-CO"/>
@@ -2773,7 +2788,7 @@
             <a:fld id="{EE425855-FD75-467C-BECD-0927F9A0E82A}" type="datetimeFigureOut">
               <a:rPr lang="es-CO" smtClean="0"/>
               <a:pPr/>
-              <a:t>21/08/2023</a:t>
+              <a:t>1/02/2022</a:t>
             </a:fld>
             <a:endParaRPr lang="es-CO"/>
           </a:p>
@@ -2927,7 +2942,7 @@
           <a:lstStyle/>
           <a:p>
             <a:r>
-              <a:rPr lang="en-US"/>
+              <a:rPr lang="en-US" smtClean="0"/>
               <a:t>Click to edit Master title style</a:t>
             </a:r>
             <a:endParaRPr lang="es-CO"/>
@@ -2951,35 +2966,35 @@
           <a:p>
             <a:pPr lvl="0"/>
             <a:r>
-              <a:rPr lang="en-US"/>
+              <a:rPr lang="en-US" smtClean="0"/>
               <a:t>Click to edit Master text styles</a:t>
             </a:r>
           </a:p>
           <a:p>
             <a:pPr lvl="1"/>
             <a:r>
-              <a:rPr lang="en-US"/>
+              <a:rPr lang="en-US" smtClean="0"/>
               <a:t>Second level</a:t>
             </a:r>
           </a:p>
           <a:p>
             <a:pPr lvl="2"/>
             <a:r>
-              <a:rPr lang="en-US"/>
+              <a:rPr lang="en-US" smtClean="0"/>
               <a:t>Third level</a:t>
             </a:r>
           </a:p>
           <a:p>
             <a:pPr lvl="3"/>
             <a:r>
-              <a:rPr lang="en-US"/>
+              <a:rPr lang="en-US" smtClean="0"/>
               <a:t>Fourth level</a:t>
             </a:r>
           </a:p>
           <a:p>
             <a:pPr lvl="4"/>
             <a:r>
-              <a:rPr lang="en-US"/>
+              <a:rPr lang="en-US" smtClean="0"/>
               <a:t>Fifth level</a:t>
             </a:r>
             <a:endParaRPr lang="es-CO"/>
@@ -3004,7 +3019,7 @@
             <a:fld id="{EE425855-FD75-467C-BECD-0927F9A0E82A}" type="datetimeFigureOut">
               <a:rPr lang="es-CO" smtClean="0"/>
               <a:pPr/>
-              <a:t>21/08/2023</a:t>
+              <a:t>1/02/2022</a:t>
             </a:fld>
             <a:endParaRPr lang="es-CO"/>
           </a:p>
@@ -3158,7 +3173,7 @@
           <a:lstStyle/>
           <a:p>
             <a:r>
-              <a:rPr lang="en-US"/>
+              <a:rPr lang="en-US" smtClean="0"/>
               <a:t>Click to edit Master title style</a:t>
             </a:r>
             <a:endParaRPr lang="es-CO"/>
@@ -3182,35 +3197,35 @@
           <a:p>
             <a:pPr lvl="0"/>
             <a:r>
-              <a:rPr lang="en-US"/>
+              <a:rPr lang="en-US" smtClean="0"/>
               <a:t>Click to edit Master text styles</a:t>
             </a:r>
           </a:p>
           <a:p>
             <a:pPr lvl="1"/>
             <a:r>
-              <a:rPr lang="en-US"/>
+              <a:rPr lang="en-US" smtClean="0"/>
               <a:t>Second level</a:t>
             </a:r>
           </a:p>
           <a:p>
             <a:pPr lvl="2"/>
             <a:r>
-              <a:rPr lang="en-US"/>
+              <a:rPr lang="en-US" smtClean="0"/>
               <a:t>Third level</a:t>
             </a:r>
           </a:p>
           <a:p>
             <a:pPr lvl="3"/>
             <a:r>
-              <a:rPr lang="en-US"/>
+              <a:rPr lang="en-US" smtClean="0"/>
               <a:t>Fourth level</a:t>
             </a:r>
           </a:p>
           <a:p>
             <a:pPr lvl="4"/>
             <a:r>
-              <a:rPr lang="en-US"/>
+              <a:rPr lang="en-US" smtClean="0"/>
               <a:t>Fifth level</a:t>
             </a:r>
             <a:endParaRPr lang="es-CO"/>
@@ -3235,7 +3250,7 @@
             <a:fld id="{EE425855-FD75-467C-BECD-0927F9A0E82A}" type="datetimeFigureOut">
               <a:rPr lang="es-CO" smtClean="0"/>
               <a:pPr/>
-              <a:t>21/08/2023</a:t>
+              <a:t>1/02/2022</a:t>
             </a:fld>
             <a:endParaRPr lang="es-CO"/>
           </a:p>
@@ -3353,6 +3368,13 @@
   <p:clrMapOvr>
     <a:masterClrMapping/>
   </p:clrMapOvr>
+  <p:timing>
+    <p:tnLst>
+      <p:par>
+        <p:cTn id="1" dur="indefinite" restart="never" nodeType="tmRoot"/>
+      </p:par>
+    </p:tnLst>
+  </p:timing>
 </p:sldLayout>
 </file>
 
@@ -3404,7 +3426,7 @@
           <a:lstStyle/>
           <a:p>
             <a:r>
-              <a:rPr lang="en-US"/>
+              <a:rPr lang="en-US" smtClean="0"/>
               <a:t>Click to edit Master title style</a:t>
             </a:r>
             <a:endParaRPr lang="es-CO"/>
@@ -3438,35 +3460,35 @@
           <a:p>
             <a:pPr lvl="0"/>
             <a:r>
-              <a:rPr lang="en-US" dirty="0"/>
+              <a:rPr lang="en-US" dirty="0" smtClean="0"/>
               <a:t>Click to edit Master text styles</a:t>
             </a:r>
           </a:p>
           <a:p>
             <a:pPr lvl="1"/>
             <a:r>
-              <a:rPr lang="en-US" dirty="0"/>
+              <a:rPr lang="en-US" dirty="0" smtClean="0"/>
               <a:t>Second level</a:t>
             </a:r>
           </a:p>
           <a:p>
             <a:pPr lvl="2"/>
             <a:r>
-              <a:rPr lang="en-US" dirty="0"/>
+              <a:rPr lang="en-US" dirty="0" smtClean="0"/>
               <a:t>Third level</a:t>
             </a:r>
           </a:p>
           <a:p>
             <a:pPr lvl="3"/>
             <a:r>
-              <a:rPr lang="en-US" dirty="0"/>
+              <a:rPr lang="en-US" dirty="0" smtClean="0"/>
               <a:t>Fourth level</a:t>
             </a:r>
           </a:p>
           <a:p>
             <a:pPr lvl="4"/>
             <a:r>
-              <a:rPr lang="en-US" dirty="0"/>
+              <a:rPr lang="en-US" dirty="0" smtClean="0"/>
               <a:t>Fifth level</a:t>
             </a:r>
             <a:endParaRPr lang="es-CO" dirty="0"/>
@@ -3509,7 +3531,7 @@
             <a:fld id="{EE425855-FD75-467C-BECD-0927F9A0E82A}" type="datetimeFigureOut">
               <a:rPr lang="es-CO" smtClean="0"/>
               <a:pPr/>
-              <a:t>21/08/2023</a:t>
+              <a:t>1/02/2022</a:t>
             </a:fld>
             <a:endParaRPr lang="es-CO"/>
           </a:p>
@@ -3604,6 +3626,13 @@
     <p:sldLayoutId id="2147483652" r:id="rId4"/>
     <p:sldLayoutId id="2147483653" r:id="rId5"/>
   </p:sldLayoutIdLst>
+  <p:timing>
+    <p:tnLst>
+      <p:par>
+        <p:cTn id="1" dur="indefinite" restart="never" nodeType="tmRoot"/>
+      </p:par>
+    </p:tnLst>
+  </p:timing>
   <p:txStyles>
     <p:titleStyle>
       <a:lvl1pPr algn="l" defTabSz="914400" rtl="0" eaLnBrk="1" latinLnBrk="0" hangingPunct="1">
@@ -3910,11 +3939,11 @@
           <a:lstStyle/>
           <a:p>
             <a:r>
-              <a:rPr lang="es-CO" sz="8000" dirty="0"/>
+              <a:rPr lang="es-CO" sz="8000" dirty="0" smtClean="0"/>
               <a:t>Web </a:t>
             </a:r>
             <a:r>
-              <a:rPr lang="es-CO" sz="8000" dirty="0" err="1"/>
+              <a:rPr lang="es-CO" sz="8000" dirty="0" err="1" smtClean="0"/>
               <a:t>Development</a:t>
             </a:r>
             <a:endParaRPr lang="es-CO" sz="8000" dirty="0"/>
@@ -3942,9 +3971,10 @@
           <a:lstStyle/>
           <a:p>
             <a:r>
-              <a:rPr lang="es-CO" dirty="0"/>
+              <a:rPr lang="es-CO" dirty="0" smtClean="0"/>
               <a:t>Desarrollo de Aplicaciones Web</a:t>
             </a:r>
+            <a:endParaRPr lang="es-CO" dirty="0"/>
           </a:p>
         </p:txBody>
       </p:sp>
@@ -3971,9 +4001,10 @@
           <a:lstStyle/>
           <a:p>
             <a:r>
-              <a:rPr lang="es-CO" dirty="0"/>
+              <a:rPr lang="es-CO" dirty="0" smtClean="0"/>
               <a:t>Julio Cesar Robles Uribe</a:t>
             </a:r>
+            <a:endParaRPr lang="es-CO" dirty="0"/>
           </a:p>
         </p:txBody>
       </p:sp>
@@ -4000,13 +4031,18 @@
           <a:lstStyle/>
           <a:p>
             <a:r>
-              <a:rPr lang="es-CO" sz="1400" dirty="0">
+              <a:rPr lang="es-CO" sz="1400" dirty="0" smtClean="0">
                 <a:solidFill>
                   <a:srgbClr val="0070C0"/>
                 </a:solidFill>
               </a:rPr>
               <a:t>Arquitecto de Soluciones</a:t>
             </a:r>
+            <a:endParaRPr lang="es-CO" sz="1400" dirty="0">
+              <a:solidFill>
+                <a:srgbClr val="0070C0"/>
+              </a:solidFill>
+            </a:endParaRPr>
           </a:p>
         </p:txBody>
       </p:sp>
@@ -4056,6 +4092,13 @@
   <p:clrMapOvr>
     <a:masterClrMapping/>
   </p:clrMapOvr>
+  <p:timing>
+    <p:tnLst>
+      <p:par>
+        <p:cTn id="1" dur="indefinite" restart="never" nodeType="tmRoot"/>
+      </p:par>
+    </p:tnLst>
+  </p:timing>
 </p:sld>
 </file>
 
@@ -4092,17 +4135,18 @@
           <a:lstStyle/>
           <a:p>
             <a:r>
-              <a:rPr lang="en-US" dirty="0"/>
+              <a:rPr lang="en-US" dirty="0" smtClean="0"/>
               <a:t>Frontend, Backend or </a:t>
             </a:r>
             <a:r>
-              <a:rPr lang="en-US" dirty="0" err="1"/>
+              <a:rPr lang="en-US" dirty="0" err="1" smtClean="0"/>
               <a:t>FullStack</a:t>
             </a:r>
             <a:r>
-              <a:rPr lang="en-US" dirty="0"/>
+              <a:rPr lang="en-US" dirty="0" smtClean="0"/>
               <a:t> Developers</a:t>
             </a:r>
+            <a:endParaRPr lang="en-US" dirty="0"/>
           </a:p>
         </p:txBody>
       </p:sp>
@@ -4124,43 +4168,75 @@
           <a:lstStyle/>
           <a:p>
             <a:r>
-              <a:rPr lang="en-US" b="1" dirty="0"/>
+              <a:rPr lang="en-US" b="1" dirty="0" smtClean="0"/>
               <a:t>Frontend</a:t>
             </a:r>
             <a:r>
-              <a:rPr lang="en-US" dirty="0"/>
+              <a:rPr lang="en-US" dirty="0" smtClean="0"/>
               <a:t>: S</a:t>
             </a:r>
             <a:r>
+              <a:rPr lang="es-ES" dirty="0" smtClean="0"/>
+              <a:t>e </a:t>
+            </a:r>
+            <a:r>
               <a:rPr lang="es-ES" dirty="0"/>
-              <a:t>e encarga de la composición, diseño e interactividad usando HTML, CSS y JavaScript.</a:t>
-            </a:r>
-          </a:p>
-          <a:p>
-            <a:r>
-              <a:rPr lang="es-ES" b="1" dirty="0" err="1"/>
+              <a:t>encarga de la composición, diseño e interactividad usando HTML, CSS y </a:t>
+            </a:r>
+            <a:r>
+              <a:rPr lang="es-ES" dirty="0" smtClean="0"/>
+              <a:t>JavaScript.</a:t>
+            </a:r>
+          </a:p>
+          <a:p>
+            <a:r>
+              <a:rPr lang="es-ES" b="1" dirty="0" err="1" smtClean="0"/>
               <a:t>Backend</a:t>
             </a:r>
             <a:r>
-              <a:rPr lang="es-ES" b="1" dirty="0"/>
+              <a:rPr lang="es-ES" b="1" dirty="0" smtClean="0"/>
               <a:t>:</a:t>
             </a:r>
             <a:r>
+              <a:rPr lang="es-ES" dirty="0" smtClean="0"/>
+              <a:t> Se </a:t>
+            </a:r>
+            <a:r>
               <a:rPr lang="es-ES" dirty="0"/>
-              <a:t> Se encarga de lo que no se ve, es decir, dónde se procesan y se almacenan los datos que </a:t>
-            </a:r>
-            <a:r>
-              <a:rPr lang="es-ES"/>
+              <a:t>encarga de lo que no se ve, es decir, dónde se </a:t>
+            </a:r>
+            <a:r>
+              <a:rPr lang="es-ES" dirty="0" smtClean="0"/>
+              <a:t>procesan y se almacenan </a:t>
+            </a:r>
+            <a:r>
+              <a:rPr lang="es-ES" dirty="0"/>
+              <a:t>los </a:t>
+            </a:r>
+            <a:r>
+              <a:rPr lang="es-ES" dirty="0" smtClean="0"/>
+              <a:t>datos</a:t>
+            </a:r>
+            <a:r>
+              <a:rPr lang="es-ES" dirty="0"/>
+              <a:t> </a:t>
+            </a:r>
+            <a:r>
+              <a:rPr lang="es-ES" dirty="0" smtClean="0"/>
+              <a:t>que </a:t>
+            </a:r>
+            <a:r>
+              <a:rPr lang="es-ES" smtClean="0"/>
               <a:t>utiliza el </a:t>
             </a:r>
             <a:r>
-              <a:rPr lang="es-ES" dirty="0"/>
+              <a:rPr lang="es-ES" dirty="0" smtClean="0"/>
               <a:t>Front.</a:t>
             </a:r>
           </a:p>
           <a:p>
             <a:r>
-              <a:rPr lang="es-ES" b="1" dirty="0" err="1"/>
+              <a:rPr lang="es-ES" b="1" dirty="0" err="1" smtClean="0"/>
               <a:t>Fullstack</a:t>
             </a:r>
             <a:r>
@@ -4176,13 +4252,14 @@
               <a:t> como del </a:t>
             </a:r>
             <a:r>
-              <a:rPr lang="es-ES" dirty="0" err="1"/>
+              <a:rPr lang="es-ES" dirty="0" err="1" smtClean="0"/>
               <a:t>Backend</a:t>
             </a:r>
             <a:r>
               <a:rPr lang="es-ES" dirty="0"/>
               <a:t>.</a:t>
             </a:r>
+            <a:endParaRPr lang="es-ES" dirty="0" smtClean="0"/>
           </a:p>
           <a:p>
             <a:endParaRPr lang="en-US" dirty="0"/>
@@ -4413,9 +4490,10 @@
           <a:p>
             <a:pPr algn="ctr"/>
             <a:r>
-              <a:rPr lang="es-CO" dirty="0"/>
+              <a:rPr lang="es-CO" dirty="0" smtClean="0"/>
               <a:t>Preguntas?</a:t>
             </a:r>
+            <a:endParaRPr lang="es-CO" dirty="0"/>
           </a:p>
         </p:txBody>
       </p:sp>
@@ -4450,6 +4528,13 @@
   <p:clrMapOvr>
     <a:masterClrMapping/>
   </p:clrMapOvr>
+  <p:timing>
+    <p:tnLst>
+      <p:par>
+        <p:cTn id="1" dur="indefinite" restart="never" nodeType="tmRoot"/>
+      </p:par>
+    </p:tnLst>
+  </p:timing>
 </p:sld>
 </file>
 
@@ -4508,7 +4593,7 @@
           <a:p>
             <a:pPr algn="ctr"/>
             <a:r>
-              <a:rPr lang="en-US" sz="6600" b="1" cap="all" dirty="0">
+              <a:rPr lang="en-US" sz="6600" b="1" cap="all" dirty="0" smtClean="0">
                 <a:ln w="0"/>
                 <a:solidFill>
                   <a:srgbClr val="0066CC">
@@ -4522,6 +4607,18 @@
               </a:rPr>
               <a:t>Gracias!!!</a:t>
             </a:r>
+            <a:endParaRPr lang="en-US" sz="6600" b="1" cap="all" dirty="0">
+              <a:ln w="0"/>
+              <a:solidFill>
+                <a:srgbClr val="0066CC">
+                  <a:alpha val="74000"/>
+                </a:srgbClr>
+              </a:solidFill>
+              <a:effectLst>
+                <a:reflection blurRad="12700" stA="50000" endPos="50000" dist="5000" dir="5400000" sy="-100000" rotWithShape="0"/>
+              </a:effectLst>
+              <a:latin typeface="Berlin Sans FB Demi" pitchFamily="34" charset="0"/>
+            </a:endParaRPr>
           </a:p>
         </p:txBody>
       </p:sp>
@@ -4530,6 +4627,13 @@
   <p:clrMapOvr>
     <a:masterClrMapping/>
   </p:clrMapOvr>
+  <p:timing>
+    <p:tnLst>
+      <p:par>
+        <p:cTn id="1" dur="indefinite" restart="never" nodeType="tmRoot"/>
+      </p:par>
+    </p:tnLst>
+  </p:timing>
 </p:sld>
 </file>
 
@@ -4566,7 +4670,7 @@
           <a:lstStyle/>
           <a:p>
             <a:r>
-              <a:rPr lang="en-US" dirty="0" err="1"/>
+              <a:rPr lang="en-US" dirty="0" err="1" smtClean="0"/>
               <a:t>Horario</a:t>
             </a:r>
             <a:endParaRPr lang="en-US" dirty="0"/>
@@ -4595,12 +4699,12 @@
           <a:graphicData uri="http://schemas.openxmlformats.org/presentationml/2006/ole">
             <mc:AlternateContent xmlns:mc="http://schemas.openxmlformats.org/markup-compatibility/2006">
               <mc:Choice xmlns:v="urn:schemas-microsoft-com:vml" Requires="v">
-                <p:oleObj name="Worksheet" r:id="rId2" imgW="1457396" imgH="1152698" progId="Excel.Sheet.12">
+                <p:oleObj spid="_x0000_s1058" name="Worksheet" r:id="rId3" imgW="1457396" imgH="1152698" progId="Excel.Sheet.12">
                   <p:embed/>
                 </p:oleObj>
               </mc:Choice>
               <mc:Fallback>
-                <p:oleObj name="Worksheet" r:id="rId2" imgW="1457396" imgH="1152698" progId="Excel.Sheet.12">
+                <p:oleObj name="Worksheet" r:id="rId3" imgW="1457396" imgH="1152698" progId="Excel.Sheet.12">
                   <p:embed/>
                   <p:pic>
                     <p:nvPicPr>
@@ -4609,7 +4713,7 @@
                       <p:nvPr/>
                     </p:nvPicPr>
                     <p:blipFill>
-                      <a:blip r:embed="rId3"/>
+                      <a:blip r:embed="rId4"/>
                       <a:stretch>
                         <a:fillRect/>
                       </a:stretch>
@@ -4635,7 +4739,7 @@
           <p:cNvPr id="6" name="Picture 8" descr="Chronometer free vector icons designed by Good Ware | Vector icon design,  Vector free, Vector icons">
             <a:extLst>
               <a:ext uri="{FF2B5EF4-FFF2-40B4-BE49-F238E27FC236}">
-                <a16:creationId xmlns:a16="http://schemas.microsoft.com/office/drawing/2014/main" id="{8D9A8D73-BE96-428E-BD83-4798528E1AD3}"/>
+                <a16:creationId xmlns="" xmlns:a16="http://schemas.microsoft.com/office/drawing/2014/main" id="{8D9A8D73-BE96-428E-BD83-4798528E1AD3}"/>
               </a:ext>
             </a:extLst>
           </p:cNvPr>
@@ -4645,7 +4749,7 @@
           <p:nvPr/>
         </p:nvPicPr>
         <p:blipFill>
-          <a:blip r:embed="rId4">
+          <a:blip r:embed="rId5">
             <a:extLst>
               <a:ext uri="{28A0092B-C50C-407E-A947-70E740481C1C}">
                 <a14:useLocalDpi xmlns:a14="http://schemas.microsoft.com/office/drawing/2010/main" val="0"/>
@@ -4687,6 +4791,13 @@
   <p:clrMapOvr>
     <a:masterClrMapping/>
   </p:clrMapOvr>
+  <p:timing>
+    <p:tnLst>
+      <p:par>
+        <p:cTn id="1" dur="indefinite" restart="never" nodeType="tmRoot"/>
+      </p:par>
+    </p:tnLst>
+  </p:timing>
 </p:sld>
 </file>
 
@@ -4723,9 +4834,10 @@
           <a:lstStyle/>
           <a:p>
             <a:r>
-              <a:rPr lang="es-CO" dirty="0"/>
+              <a:rPr lang="es-CO" dirty="0" smtClean="0"/>
               <a:t>Presentación personal</a:t>
             </a:r>
+            <a:endParaRPr lang="es-CO" dirty="0"/>
           </a:p>
         </p:txBody>
       </p:sp>
@@ -4888,8 +5000,13 @@
             </a:pPr>
             <a:r>
               <a:rPr lang="es-CO" sz="2400" dirty="0"/>
-              <a:t>Profesor Universitario</a:t>
-            </a:r>
+              <a:t>Profesor </a:t>
+            </a:r>
+            <a:r>
+              <a:rPr lang="es-CO" sz="2400" dirty="0" smtClean="0"/>
+              <a:t>Universitario</a:t>
+            </a:r>
+            <a:endParaRPr lang="es-CO" sz="2400" dirty="0"/>
           </a:p>
         </p:txBody>
       </p:sp>
@@ -4898,7 +5015,7 @@
           <p:cNvPr id="16" name="Picture 15" descr="A person smiling for the camera&#10;&#10;Description automatically generated with low confidence">
             <a:extLst>
               <a:ext uri="{FF2B5EF4-FFF2-40B4-BE49-F238E27FC236}">
-                <a16:creationId xmlns:a16="http://schemas.microsoft.com/office/drawing/2014/main" id="{5DC97C0D-EB9B-4F0B-93EF-0D1AFD5A629D}"/>
+                <a16:creationId xmlns="" xmlns:a16="http://schemas.microsoft.com/office/drawing/2014/main" id="{5DC97C0D-EB9B-4F0B-93EF-0D1AFD5A629D}"/>
               </a:ext>
             </a:extLst>
           </p:cNvPr>
@@ -4944,7 +5061,7 @@
           <p:cNvPr id="17" name="TextBox 16">
             <a:extLst>
               <a:ext uri="{FF2B5EF4-FFF2-40B4-BE49-F238E27FC236}">
-                <a16:creationId xmlns:a16="http://schemas.microsoft.com/office/drawing/2014/main" id="{AB3A3CA4-03A7-4CAF-9E47-6B8D04208568}"/>
+                <a16:creationId xmlns="" xmlns:a16="http://schemas.microsoft.com/office/drawing/2014/main" id="{AB3A3CA4-03A7-4CAF-9E47-6B8D04208568}"/>
               </a:ext>
             </a:extLst>
           </p:cNvPr>
@@ -4988,7 +5105,7 @@
           <p:cNvPr id="18" name="TextBox 17">
             <a:extLst>
               <a:ext uri="{FF2B5EF4-FFF2-40B4-BE49-F238E27FC236}">
-                <a16:creationId xmlns:a16="http://schemas.microsoft.com/office/drawing/2014/main" id="{37F4DB09-ECAD-411E-957C-E734FFFF3CD0}"/>
+                <a16:creationId xmlns="" xmlns:a16="http://schemas.microsoft.com/office/drawing/2014/main" id="{37F4DB09-ECAD-411E-957C-E734FFFF3CD0}"/>
               </a:ext>
             </a:extLst>
           </p:cNvPr>
@@ -5035,6 +5152,13 @@
   <p:clrMapOvr>
     <a:masterClrMapping/>
   </p:clrMapOvr>
+  <p:timing>
+    <p:tnLst>
+      <p:par>
+        <p:cTn id="1" dur="indefinite" restart="never" nodeType="tmRoot"/>
+      </p:par>
+    </p:tnLst>
+  </p:timing>
 </p:sld>
 </file>
 
@@ -5071,9 +5195,10 @@
           <a:lstStyle/>
           <a:p>
             <a:r>
-              <a:rPr lang="es-CO" dirty="0"/>
+              <a:rPr lang="es-CO" dirty="0" smtClean="0"/>
               <a:t>Presentación personal</a:t>
             </a:r>
+            <a:endParaRPr lang="es-CO" dirty="0"/>
           </a:p>
         </p:txBody>
       </p:sp>
@@ -5105,9 +5230,10 @@
               </a:spcAft>
             </a:pPr>
             <a:r>
-              <a:rPr lang="es-CO" sz="2400" dirty="0"/>
+              <a:rPr lang="es-CO" sz="2400" dirty="0" smtClean="0"/>
               <a:t>Nombre Completo</a:t>
             </a:r>
+            <a:endParaRPr lang="es-CO" sz="2400" dirty="0"/>
           </a:p>
           <a:p>
             <a:pPr marL="285750" indent="-285750">
@@ -5116,17 +5242,22 @@
               </a:spcAft>
             </a:pPr>
             <a:r>
+              <a:rPr lang="es-CO" sz="2400" dirty="0" smtClean="0"/>
+              <a:t>Facultad</a:t>
+            </a:r>
+            <a:r>
               <a:rPr lang="es-CO" sz="2400" dirty="0"/>
-              <a:t>Facultad </a:t>
+              <a:t> </a:t>
             </a:r>
             <a:r>
               <a:rPr lang="en-US" sz="2400" dirty="0"/>
               <a:t>ó</a:t>
             </a:r>
             <a:r>
-              <a:rPr lang="es-CO" sz="2400" dirty="0"/>
+              <a:rPr lang="es-CO" sz="2400" dirty="0" smtClean="0"/>
               <a:t> Carrera</a:t>
             </a:r>
+            <a:endParaRPr lang="es-CO" sz="2400" dirty="0"/>
           </a:p>
           <a:p>
             <a:pPr marL="285750" indent="-285750">
@@ -5135,9 +5266,10 @@
               </a:spcAft>
             </a:pPr>
             <a:r>
-              <a:rPr lang="es-CO" sz="2400" dirty="0"/>
+              <a:rPr lang="es-CO" sz="2400" dirty="0" smtClean="0"/>
               <a:t>Semestre</a:t>
             </a:r>
+            <a:endParaRPr lang="es-CO" sz="2400" dirty="0"/>
           </a:p>
           <a:p>
             <a:pPr marL="285750" indent="-285750">
@@ -5146,9 +5278,10 @@
               </a:spcAft>
             </a:pPr>
             <a:r>
-              <a:rPr lang="es-CO" sz="2400" dirty="0"/>
+              <a:rPr lang="es-CO" sz="2400" dirty="0" smtClean="0"/>
               <a:t>Trabajas?</a:t>
             </a:r>
+            <a:endParaRPr lang="es-CO" sz="2400" dirty="0"/>
           </a:p>
           <a:p>
             <a:pPr marL="685800" lvl="1">
@@ -5157,7 +5290,7 @@
               </a:spcAft>
             </a:pPr>
             <a:r>
-              <a:rPr lang="es-CO" sz="2000" dirty="0"/>
+              <a:rPr lang="es-CO" sz="2000" dirty="0" smtClean="0"/>
               <a:t>Empresa?</a:t>
             </a:r>
           </a:p>
@@ -5168,8 +5301,12 @@
               </a:spcAft>
             </a:pPr>
             <a:r>
-              <a:rPr lang="es-CO" sz="2000" dirty="0"/>
-              <a:t>Rol o Cargo?</a:t>
+              <a:rPr lang="es-CO" sz="2000" dirty="0" smtClean="0"/>
+              <a:t>Rol o Cargo</a:t>
+            </a:r>
+            <a:r>
+              <a:rPr lang="es-CO" sz="2000" dirty="0" smtClean="0"/>
+              <a:t>?</a:t>
             </a:r>
           </a:p>
           <a:p>
@@ -5179,7 +5316,7 @@
               </a:spcAft>
             </a:pPr>
             <a:r>
-              <a:rPr lang="es-CO" sz="2400" dirty="0"/>
+              <a:rPr lang="es-CO" sz="2400" dirty="0" smtClean="0"/>
               <a:t>Tiempo de Experiencia en TI</a:t>
             </a:r>
           </a:p>
@@ -5190,11 +5327,11 @@
               </a:spcAft>
             </a:pPr>
             <a:r>
-              <a:rPr lang="es-CO" sz="2400" dirty="0"/>
+              <a:rPr lang="es-CO" sz="2400" dirty="0" smtClean="0"/>
               <a:t>Qué </a:t>
             </a:r>
             <a:r>
-              <a:rPr lang="es-CO" sz="2400"/>
+              <a:rPr lang="es-CO" sz="2400" smtClean="0"/>
               <a:t>lenguajes conoces?</a:t>
             </a:r>
             <a:endParaRPr lang="es-CO" sz="2400" dirty="0"/>
@@ -5206,9 +5343,10 @@
               </a:spcAft>
             </a:pPr>
             <a:r>
-              <a:rPr lang="es-CO" sz="2400" dirty="0"/>
+              <a:rPr lang="es-CO" sz="2400" dirty="0" smtClean="0"/>
               <a:t>Qué expectativas tienes con este curso?</a:t>
             </a:r>
+            <a:endParaRPr lang="es-CO" sz="2400" dirty="0"/>
           </a:p>
         </p:txBody>
       </p:sp>
@@ -5222,6 +5360,13 @@
   <p:clrMapOvr>
     <a:masterClrMapping/>
   </p:clrMapOvr>
+  <p:timing>
+    <p:tnLst>
+      <p:par>
+        <p:cTn id="1" dur="indefinite" restart="never" nodeType="tmRoot"/>
+      </p:par>
+    </p:tnLst>
+  </p:timing>
 </p:sld>
 </file>
 
@@ -5258,9 +5403,10 @@
           <a:lstStyle/>
           <a:p>
             <a:r>
-              <a:rPr lang="es-CO" dirty="0"/>
+              <a:rPr lang="es-CO" dirty="0" smtClean="0"/>
               <a:t>Introducción</a:t>
             </a:r>
+            <a:endParaRPr lang="es-CO" dirty="0"/>
           </a:p>
         </p:txBody>
       </p:sp>
@@ -5288,11 +5434,11 @@
           <a:p>
             <a:pPr algn="just"/>
             <a:r>
-              <a:rPr lang="es-CO" dirty="0"/>
+              <a:rPr lang="es-CO" dirty="0" smtClean="0"/>
               <a:t>En este curso se cubrirán los </a:t>
             </a:r>
             <a:r>
-              <a:rPr lang="es-CO" b="1" dirty="0">
+              <a:rPr lang="es-CO" b="1" dirty="0" smtClean="0">
                 <a:solidFill>
                   <a:schemeClr val="accent3"/>
                 </a:solidFill>
@@ -5300,15 +5446,15 @@
               <a:t>temas básicos</a:t>
             </a:r>
             <a:r>
-              <a:rPr lang="es-CO" b="1" dirty="0"/>
+              <a:rPr lang="es-CO" b="1" dirty="0" smtClean="0"/>
               <a:t> </a:t>
             </a:r>
             <a:r>
-              <a:rPr lang="es-CO" dirty="0"/>
+              <a:rPr lang="es-CO" dirty="0" smtClean="0"/>
               <a:t>para convertirse en un </a:t>
             </a:r>
             <a:r>
-              <a:rPr lang="es-CO" b="1" dirty="0">
+              <a:rPr lang="es-CO" b="1" dirty="0" smtClean="0">
                 <a:solidFill>
                   <a:schemeClr val="accent1"/>
                 </a:solidFill>
@@ -5316,11 +5462,11 @@
               <a:t>desarrollador web</a:t>
             </a:r>
             <a:r>
-              <a:rPr lang="es-CO" dirty="0"/>
+              <a:rPr lang="es-CO" dirty="0" smtClean="0"/>
               <a:t>, con conocimientos tanto en </a:t>
             </a:r>
             <a:r>
-              <a:rPr lang="es-CO" b="1" dirty="0">
+              <a:rPr lang="es-CO" b="1" dirty="0" smtClean="0">
                 <a:solidFill>
                   <a:schemeClr val="accent6"/>
                 </a:solidFill>
@@ -5328,7 +5474,7 @@
               <a:t>Front-</a:t>
             </a:r>
             <a:r>
-              <a:rPr lang="es-CO" b="1" dirty="0" err="1">
+              <a:rPr lang="es-CO" b="1" dirty="0" err="1" smtClean="0">
                 <a:solidFill>
                   <a:schemeClr val="accent6"/>
                 </a:solidFill>
@@ -5336,11 +5482,11 @@
               <a:t>End</a:t>
             </a:r>
             <a:r>
-              <a:rPr lang="es-CO" dirty="0"/>
+              <a:rPr lang="es-CO" dirty="0" smtClean="0"/>
               <a:t> como en </a:t>
             </a:r>
             <a:r>
-              <a:rPr lang="es-CO" b="1" dirty="0">
+              <a:rPr lang="es-CO" b="1" dirty="0" smtClean="0">
                 <a:solidFill>
                   <a:srgbClr val="7030A0"/>
                 </a:solidFill>
@@ -5348,7 +5494,7 @@
               <a:t>Back-</a:t>
             </a:r>
             <a:r>
-              <a:rPr lang="es-CO" b="1" dirty="0" err="1">
+              <a:rPr lang="es-CO" b="1" dirty="0" err="1" smtClean="0">
                 <a:solidFill>
                   <a:srgbClr val="7030A0"/>
                 </a:solidFill>
@@ -5359,6 +5505,7 @@
               <a:rPr lang="es-CO" dirty="0"/>
               <a:t>.</a:t>
             </a:r>
+            <a:endParaRPr lang="es-CO" dirty="0" smtClean="0"/>
           </a:p>
           <a:p>
             <a:pPr>
@@ -5397,6 +5544,13 @@
   <p:clrMapOvr>
     <a:masterClrMapping/>
   </p:clrMapOvr>
+  <p:timing>
+    <p:tnLst>
+      <p:par>
+        <p:cTn id="1" dur="indefinite" restart="never" nodeType="tmRoot"/>
+      </p:par>
+    </p:tnLst>
+  </p:timing>
 </p:sld>
 </file>
 
@@ -5433,9 +5587,10 @@
           <a:lstStyle/>
           <a:p>
             <a:r>
-              <a:rPr lang="es-CO" dirty="0"/>
+              <a:rPr lang="es-CO" dirty="0" smtClean="0"/>
               <a:t>Qué aprenderemos?</a:t>
             </a:r>
+            <a:endParaRPr lang="es-CO" dirty="0"/>
           </a:p>
         </p:txBody>
       </p:sp>
@@ -5452,25 +5607,74 @@
         <p:spPr>
           <a:xfrm>
             <a:off x="457200" y="1600201"/>
-            <a:ext cx="5122912" cy="3989040"/>
+            <a:ext cx="8219256" cy="3989040"/>
           </a:xfrm>
         </p:spPr>
         <p:txBody>
           <a:bodyPr>
-            <a:normAutofit/>
+            <a:normAutofit fontScale="70000" lnSpcReduction="20000"/>
           </a:bodyPr>
           <a:lstStyle/>
           <a:p>
             <a:r>
               <a:rPr lang="es-CO" dirty="0"/>
-              <a:t>HTML5/CSS3/JavaScript</a:t>
+              <a:t>HTML Basic/HTML5</a:t>
             </a:r>
           </a:p>
           <a:p>
             <a:r>
               <a:rPr lang="es-CO" dirty="0"/>
+              <a:t>CSS Basic/</a:t>
+            </a:r>
+            <a:r>
+              <a:rPr lang="es-CO" dirty="0" err="1"/>
+              <a:t>Intermediate</a:t>
+            </a:r>
+            <a:r>
+              <a:rPr lang="es-CO" dirty="0"/>
+              <a:t>/CSS3</a:t>
+            </a:r>
+          </a:p>
+          <a:p>
+            <a:r>
+              <a:rPr lang="es-CO" dirty="0" err="1"/>
               <a:t>Bootstrap</a:t>
             </a:r>
+            <a:r>
+              <a:rPr lang="es-CO" dirty="0"/>
+              <a:t>/</a:t>
+            </a:r>
+            <a:r>
+              <a:rPr lang="es-CO" dirty="0" err="1"/>
+              <a:t>Flexbox</a:t>
+            </a:r>
+            <a:r>
+              <a:rPr lang="es-CO" dirty="0"/>
+              <a:t>/</a:t>
+            </a:r>
+            <a:r>
+              <a:rPr lang="es-CO" dirty="0" err="1"/>
+              <a:t>Saas</a:t>
+            </a:r>
+            <a:endParaRPr lang="es-CO" dirty="0"/>
+          </a:p>
+          <a:p>
+            <a:r>
+              <a:rPr lang="es-CO" dirty="0"/>
+              <a:t>JavaScript Basic </a:t>
+            </a:r>
+            <a:r>
+              <a:rPr lang="es-CO" dirty="0" err="1"/>
+              <a:t>Concepts</a:t>
+            </a:r>
+            <a:endParaRPr lang="es-CO" dirty="0"/>
+          </a:p>
+          <a:p>
+            <a:r>
+              <a:rPr lang="es-CO" dirty="0" err="1"/>
+              <a:t>jQuery</a:t>
+            </a:r>
+            <a:endParaRPr lang="es-CO" dirty="0"/>
           </a:p>
           <a:p>
             <a:r>
@@ -5496,6 +5700,89 @@
             <a:r>
               <a:rPr lang="es-CO" dirty="0"/>
               <a:t> Core</a:t>
+            </a:r>
+          </a:p>
+          <a:p>
+            <a:r>
+              <a:rPr lang="es-CO" dirty="0" err="1"/>
+              <a:t>Backend</a:t>
+            </a:r>
+            <a:r>
+              <a:rPr lang="es-CO" dirty="0"/>
+              <a:t> </a:t>
+            </a:r>
+            <a:r>
+              <a:rPr lang="es-CO" dirty="0" err="1"/>
+              <a:t>with</a:t>
+            </a:r>
+            <a:r>
+              <a:rPr lang="es-CO" dirty="0"/>
+              <a:t> </a:t>
+            </a:r>
+            <a:r>
+              <a:rPr lang="es-CO" dirty="0" err="1"/>
+              <a:t>Node</a:t>
+            </a:r>
+            <a:endParaRPr lang="es-CO" dirty="0"/>
+          </a:p>
+          <a:p>
+            <a:r>
+              <a:rPr lang="es-CO" dirty="0" err="1"/>
+              <a:t>Design</a:t>
+            </a:r>
+            <a:r>
+              <a:rPr lang="es-CO" dirty="0"/>
+              <a:t> data </a:t>
+            </a:r>
+            <a:r>
+              <a:rPr lang="es-CO" dirty="0" err="1"/>
+              <a:t>with</a:t>
+            </a:r>
+            <a:r>
+              <a:rPr lang="es-CO" dirty="0"/>
+              <a:t> </a:t>
+            </a:r>
+            <a:r>
+              <a:rPr lang="es-CO" dirty="0" err="1"/>
+              <a:t>MySQL</a:t>
+            </a:r>
+            <a:endParaRPr lang="es-CO" dirty="0"/>
+          </a:p>
+          <a:p>
+            <a:r>
+              <a:rPr lang="es-CO" dirty="0" err="1"/>
+              <a:t>NoSQL</a:t>
+            </a:r>
+            <a:r>
+              <a:rPr lang="es-CO" dirty="0"/>
+              <a:t> </a:t>
+            </a:r>
+            <a:r>
+              <a:rPr lang="es-CO" dirty="0" err="1"/>
+              <a:t>database</a:t>
+            </a:r>
+            <a:r>
+              <a:rPr lang="es-CO" dirty="0"/>
+              <a:t>: </a:t>
+            </a:r>
+            <a:r>
+              <a:rPr lang="es-CO" dirty="0" err="1"/>
+              <a:t>MongoDB</a:t>
+            </a:r>
+            <a:endParaRPr lang="es-CO" dirty="0"/>
+          </a:p>
+          <a:p>
+            <a:r>
+              <a:rPr lang="es-CO" dirty="0"/>
+              <a:t>App </a:t>
+            </a:r>
+            <a:r>
+              <a:rPr lang="es-CO" dirty="0" err="1"/>
+              <a:t>with</a:t>
+            </a:r>
+            <a:r>
+              <a:rPr lang="es-CO" dirty="0"/>
+              <a:t> Angular</a:t>
             </a:r>
           </a:p>
           <a:p>
@@ -5545,7 +5832,7 @@
         </p:blipFill>
         <p:spPr bwMode="auto">
           <a:xfrm>
-            <a:off x="5081901" y="2132856"/>
+            <a:off x="4257980" y="1550245"/>
             <a:ext cx="914400" cy="914400"/>
           </a:xfrm>
           <a:prstGeom prst="rect">
@@ -5586,7 +5873,7 @@
         </p:blipFill>
         <p:spPr bwMode="auto">
           <a:xfrm>
-            <a:off x="6053516" y="2132856"/>
+            <a:off x="5229595" y="1550245"/>
             <a:ext cx="648125" cy="914400"/>
           </a:xfrm>
           <a:prstGeom prst="rect">
@@ -5627,7 +5914,7 @@
         </p:blipFill>
         <p:spPr bwMode="auto">
           <a:xfrm>
-            <a:off x="6758856" y="2132856"/>
+            <a:off x="5934935" y="1550245"/>
             <a:ext cx="649225" cy="914400"/>
           </a:xfrm>
           <a:prstGeom prst="rect">
@@ -5668,7 +5955,7 @@
         </p:blipFill>
         <p:spPr bwMode="auto">
           <a:xfrm>
-            <a:off x="7465296" y="2132856"/>
+            <a:off x="6641375" y="1550245"/>
             <a:ext cx="1219200" cy="914400"/>
           </a:xfrm>
           <a:prstGeom prst="rect">
@@ -5688,7 +5975,7 @@
       </p:pic>
       <p:pic>
         <p:nvPicPr>
-          <p:cNvPr id="2070" name="Picture 22" descr="Archivo:.NET Core Logo.svg - Wikipedia, la enciclopedia libre"/>
+          <p:cNvPr id="2068" name="Picture 20" descr="jQuery-logo - Red Code&amp;#39;"/>
           <p:cNvPicPr>
             <a:picLocks noChangeAspect="1" noChangeArrowheads="1"/>
           </p:cNvPicPr>
@@ -5709,7 +5996,7 @@
         </p:blipFill>
         <p:spPr bwMode="auto">
           <a:xfrm>
-            <a:off x="5787241" y="3583303"/>
+            <a:off x="7917789" y="1550245"/>
             <a:ext cx="914400" cy="914400"/>
           </a:xfrm>
           <a:prstGeom prst="rect">
@@ -5729,7 +6016,7 @@
       </p:pic>
       <p:pic>
         <p:nvPicPr>
-          <p:cNvPr id="2086" name="Picture 38" descr="React - Wikipedia, la enciclopedia libre"/>
+          <p:cNvPr id="2070" name="Picture 22" descr="Archivo:.NET Core Logo.svg - Wikipedia, la enciclopedia libre"/>
           <p:cNvPicPr>
             <a:picLocks noChangeAspect="1" noChangeArrowheads="1"/>
           </p:cNvPicPr>
@@ -5750,7 +6037,222 @@
         </p:blipFill>
         <p:spPr bwMode="auto">
           <a:xfrm>
-            <a:off x="7112601" y="3601566"/>
+            <a:off x="5197817" y="2824366"/>
+            <a:ext cx="914400" cy="914400"/>
+          </a:xfrm>
+          <a:prstGeom prst="rect">
+            <a:avLst/>
+          </a:prstGeom>
+          <a:noFill/>
+          <a:extLst>
+            <a:ext uri="{909E8E84-426E-40DD-AFC4-6F175D3DCCD1}">
+              <a14:hiddenFill xmlns:a14="http://schemas.microsoft.com/office/drawing/2010/main">
+                <a:solidFill>
+                  <a:srgbClr val="FFFFFF"/>
+                </a:solidFill>
+              </a14:hiddenFill>
+            </a:ext>
+          </a:extLst>
+        </p:spPr>
+      </p:pic>
+      <p:pic>
+        <p:nvPicPr>
+          <p:cNvPr id="2078" name="Picture 30" descr="Archivo:Node.js logo.svg - Wikipedia, la enciclopedia libre"/>
+          <p:cNvPicPr>
+            <a:picLocks noChangeAspect="1" noChangeArrowheads="1"/>
+          </p:cNvPicPr>
+          <p:nvPr/>
+        </p:nvPicPr>
+        <p:blipFill>
+          <a:blip r:embed="rId8" cstate="print">
+            <a:extLst>
+              <a:ext uri="{28A0092B-C50C-407E-A947-70E740481C1C}">
+                <a14:useLocalDpi xmlns:a14="http://schemas.microsoft.com/office/drawing/2010/main" val="0"/>
+              </a:ext>
+            </a:extLst>
+          </a:blip>
+          <a:srcRect/>
+          <a:stretch>
+            <a:fillRect/>
+          </a:stretch>
+        </p:blipFill>
+        <p:spPr bwMode="auto">
+          <a:xfrm>
+            <a:off x="6503572" y="2837792"/>
+            <a:ext cx="1494805" cy="914400"/>
+          </a:xfrm>
+          <a:prstGeom prst="rect">
+            <a:avLst/>
+          </a:prstGeom>
+          <a:noFill/>
+          <a:extLst>
+            <a:ext uri="{909E8E84-426E-40DD-AFC4-6F175D3DCCD1}">
+              <a14:hiddenFill xmlns:a14="http://schemas.microsoft.com/office/drawing/2010/main">
+                <a:solidFill>
+                  <a:srgbClr val="FFFFFF"/>
+                </a:solidFill>
+              </a14:hiddenFill>
+            </a:ext>
+          </a:extLst>
+        </p:spPr>
+      </p:pic>
+      <p:pic>
+        <p:nvPicPr>
+          <p:cNvPr id="2080" name="Picture 32" descr="MySQL dynamic insertion by a python script | Thepiguy"/>
+          <p:cNvPicPr preferRelativeResize="0">
+            <a:picLocks noChangeArrowheads="1"/>
+          </p:cNvPicPr>
+          <p:nvPr/>
+        </p:nvPicPr>
+        <p:blipFill>
+          <a:blip r:embed="rId9" cstate="print">
+            <a:clrChange>
+              <a:clrFrom>
+                <a:srgbClr val="FFFFFF"/>
+              </a:clrFrom>
+              <a:clrTo>
+                <a:srgbClr val="FFFFFF">
+                  <a:alpha val="0"/>
+                </a:srgbClr>
+              </a:clrTo>
+            </a:clrChange>
+            <a:extLst>
+              <a:ext uri="{28A0092B-C50C-407E-A947-70E740481C1C}">
+                <a14:useLocalDpi xmlns:a14="http://schemas.microsoft.com/office/drawing/2010/main" val="0"/>
+              </a:ext>
+            </a:extLst>
+          </a:blip>
+          <a:srcRect/>
+          <a:stretch>
+            <a:fillRect/>
+          </a:stretch>
+        </p:blipFill>
+        <p:spPr bwMode="auto">
+          <a:xfrm>
+            <a:off x="4281247" y="3934755"/>
+            <a:ext cx="2286000" cy="914400"/>
+          </a:xfrm>
+          <a:prstGeom prst="rect">
+            <a:avLst/>
+          </a:prstGeom>
+          <a:noFill/>
+          <a:extLst>
+            <a:ext uri="{909E8E84-426E-40DD-AFC4-6F175D3DCCD1}">
+              <a14:hiddenFill xmlns:a14="http://schemas.microsoft.com/office/drawing/2010/main">
+                <a:solidFill>
+                  <a:srgbClr val="FFFFFF"/>
+                </a:solidFill>
+              </a14:hiddenFill>
+            </a:ext>
+          </a:extLst>
+        </p:spPr>
+      </p:pic>
+      <p:pic>
+        <p:nvPicPr>
+          <p:cNvPr id="2082" name="Picture 34" descr="Kubirds - Home"/>
+          <p:cNvPicPr preferRelativeResize="0">
+            <a:picLocks noChangeArrowheads="1"/>
+          </p:cNvPicPr>
+          <p:nvPr/>
+        </p:nvPicPr>
+        <p:blipFill>
+          <a:blip r:embed="rId10" cstate="print">
+            <a:extLst>
+              <a:ext uri="{28A0092B-C50C-407E-A947-70E740481C1C}">
+                <a14:useLocalDpi xmlns:a14="http://schemas.microsoft.com/office/drawing/2010/main" val="0"/>
+              </a:ext>
+            </a:extLst>
+          </a:blip>
+          <a:srcRect/>
+          <a:stretch>
+            <a:fillRect/>
+          </a:stretch>
+        </p:blipFill>
+        <p:spPr bwMode="auto">
+          <a:xfrm>
+            <a:off x="6666730" y="3934755"/>
+            <a:ext cx="2286000" cy="914400"/>
+          </a:xfrm>
+          <a:prstGeom prst="rect">
+            <a:avLst/>
+          </a:prstGeom>
+          <a:noFill/>
+          <a:extLst>
+            <a:ext uri="{909E8E84-426E-40DD-AFC4-6F175D3DCCD1}">
+              <a14:hiddenFill xmlns:a14="http://schemas.microsoft.com/office/drawing/2010/main">
+                <a:solidFill>
+                  <a:srgbClr val="FFFFFF"/>
+                </a:solidFill>
+              </a14:hiddenFill>
+            </a:ext>
+          </a:extLst>
+        </p:spPr>
+      </p:pic>
+      <p:pic>
+        <p:nvPicPr>
+          <p:cNvPr id="2084" name="Picture 36" descr="Angular: Mucho más que un framework | SG Buzz"/>
+          <p:cNvPicPr>
+            <a:picLocks noChangeAspect="1" noChangeArrowheads="1"/>
+          </p:cNvPicPr>
+          <p:nvPr/>
+        </p:nvPicPr>
+        <p:blipFill>
+          <a:blip r:embed="rId11" cstate="print">
+            <a:extLst>
+              <a:ext uri="{28A0092B-C50C-407E-A947-70E740481C1C}">
+                <a14:useLocalDpi xmlns:a14="http://schemas.microsoft.com/office/drawing/2010/main" val="0"/>
+              </a:ext>
+            </a:extLst>
+          </a:blip>
+          <a:srcRect/>
+          <a:stretch>
+            <a:fillRect/>
+          </a:stretch>
+        </p:blipFill>
+        <p:spPr bwMode="auto">
+          <a:xfrm>
+            <a:off x="5206674" y="5328030"/>
+            <a:ext cx="1042416" cy="914400"/>
+          </a:xfrm>
+          <a:prstGeom prst="rect">
+            <a:avLst/>
+          </a:prstGeom>
+          <a:noFill/>
+          <a:extLst>
+            <a:ext uri="{909E8E84-426E-40DD-AFC4-6F175D3DCCD1}">
+              <a14:hiddenFill xmlns:a14="http://schemas.microsoft.com/office/drawing/2010/main">
+                <a:solidFill>
+                  <a:srgbClr val="FFFFFF"/>
+                </a:solidFill>
+              </a14:hiddenFill>
+            </a:ext>
+          </a:extLst>
+        </p:spPr>
+      </p:pic>
+      <p:pic>
+        <p:nvPicPr>
+          <p:cNvPr id="2086" name="Picture 38" descr="React - Wikipedia, la enciclopedia libre"/>
+          <p:cNvPicPr>
+            <a:picLocks noChangeAspect="1" noChangeArrowheads="1"/>
+          </p:cNvPicPr>
+          <p:nvPr/>
+        </p:nvPicPr>
+        <p:blipFill>
+          <a:blip r:embed="rId12" cstate="print">
+            <a:extLst>
+              <a:ext uri="{28A0092B-C50C-407E-A947-70E740481C1C}">
+                <a14:useLocalDpi xmlns:a14="http://schemas.microsoft.com/office/drawing/2010/main" val="0"/>
+              </a:ext>
+            </a:extLst>
+          </a:blip>
+          <a:srcRect/>
+          <a:stretch>
+            <a:fillRect/>
+          </a:stretch>
+        </p:blipFill>
+        <p:spPr bwMode="auto">
+          <a:xfrm>
+            <a:off x="6551088" y="5314604"/>
             <a:ext cx="1052042" cy="914400"/>
           </a:xfrm>
           <a:prstGeom prst="rect">
@@ -5773,6 +6275,13 @@
   <p:clrMapOvr>
     <a:masterClrMapping/>
   </p:clrMapOvr>
+  <p:timing>
+    <p:tnLst>
+      <p:par>
+        <p:cTn id="1" dur="indefinite" restart="never" nodeType="tmRoot"/>
+      </p:par>
+    </p:tnLst>
+  </p:timing>
 </p:sld>
 </file>
 
@@ -5809,9 +6318,10 @@
           <a:lstStyle/>
           <a:p>
             <a:r>
-              <a:rPr lang="es-CO" dirty="0"/>
+              <a:rPr lang="es-CO" dirty="0" smtClean="0"/>
               <a:t>Pre-Requisitos</a:t>
             </a:r>
+            <a:endParaRPr lang="es-CO" dirty="0"/>
           </a:p>
         </p:txBody>
       </p:sp>
@@ -5838,86 +6348,86 @@
           <a:lstStyle/>
           <a:p>
             <a:r>
-              <a:rPr lang="es-CO" sz="2800" dirty="0"/>
+              <a:rPr lang="es-CO" sz="2800" dirty="0" smtClean="0"/>
               <a:t>Conocimientos</a:t>
             </a:r>
           </a:p>
           <a:p>
             <a:pPr lvl="1"/>
             <a:r>
-              <a:rPr lang="es-CO" sz="2000" dirty="0"/>
+              <a:rPr lang="es-CO" sz="2000" dirty="0" smtClean="0"/>
               <a:t>Conocimientos básicos de programación</a:t>
             </a:r>
           </a:p>
           <a:p>
             <a:pPr lvl="1"/>
             <a:r>
-              <a:rPr lang="es-CO" sz="2000" dirty="0"/>
+              <a:rPr lang="es-CO" sz="2000" dirty="0" smtClean="0"/>
               <a:t>Conocimiento básico de sentencias SQL</a:t>
             </a:r>
           </a:p>
           <a:p>
             <a:pPr lvl="1"/>
             <a:r>
-              <a:rPr lang="es-CO" sz="2000" dirty="0"/>
+              <a:rPr lang="es-CO" sz="2000" dirty="0" smtClean="0"/>
               <a:t>Conocimiento de </a:t>
             </a:r>
             <a:r>
-              <a:rPr lang="es-CO" sz="2000" dirty="0" err="1"/>
+              <a:rPr lang="es-CO" sz="2000" dirty="0" err="1" smtClean="0"/>
               <a:t>Git</a:t>
             </a:r>
             <a:r>
-              <a:rPr lang="es-CO" sz="2000" dirty="0"/>
+              <a:rPr lang="es-CO" sz="2000" dirty="0" smtClean="0"/>
               <a:t> / </a:t>
             </a:r>
             <a:r>
-              <a:rPr lang="es-CO" sz="2000" dirty="0" err="1"/>
+              <a:rPr lang="es-CO" sz="2000" dirty="0" err="1" smtClean="0"/>
               <a:t>Git</a:t>
             </a:r>
             <a:r>
-              <a:rPr lang="es-CO" sz="2000" dirty="0"/>
+              <a:rPr lang="es-CO" sz="2000" dirty="0" smtClean="0"/>
               <a:t> </a:t>
             </a:r>
             <a:r>
-              <a:rPr lang="es-CO" sz="2000" dirty="0" err="1"/>
+              <a:rPr lang="es-CO" sz="2000" dirty="0" err="1" smtClean="0"/>
               <a:t>Flow</a:t>
             </a:r>
             <a:endParaRPr lang="es-CO" sz="2000" dirty="0"/>
           </a:p>
           <a:p>
             <a:r>
-              <a:rPr lang="es-CO" sz="2400" dirty="0"/>
+              <a:rPr lang="es-CO" sz="2400" dirty="0" smtClean="0"/>
               <a:t>Herramientas</a:t>
             </a:r>
           </a:p>
           <a:p>
             <a:pPr lvl="1"/>
             <a:r>
-              <a:rPr lang="es-CO" sz="2000" dirty="0"/>
+              <a:rPr lang="es-CO" sz="2000" dirty="0" smtClean="0"/>
               <a:t>Visual Studio </a:t>
             </a:r>
             <a:r>
-              <a:rPr lang="es-CO" sz="2000" dirty="0" err="1"/>
+              <a:rPr lang="es-CO" sz="2000" dirty="0" err="1" smtClean="0"/>
               <a:t>Code</a:t>
             </a:r>
-            <a:endParaRPr lang="es-CO" sz="2000" dirty="0"/>
+            <a:endParaRPr lang="es-CO" sz="2000" dirty="0" smtClean="0"/>
           </a:p>
           <a:p>
             <a:pPr lvl="1"/>
             <a:r>
-              <a:rPr lang="es-CO" sz="2000" dirty="0" err="1"/>
+              <a:rPr lang="es-CO" sz="2000" dirty="0" err="1" smtClean="0"/>
               <a:t>Git</a:t>
             </a:r>
-            <a:endParaRPr lang="es-CO" sz="2000" dirty="0"/>
+            <a:endParaRPr lang="es-CO" sz="2000" dirty="0" smtClean="0"/>
           </a:p>
           <a:p>
             <a:pPr lvl="1"/>
             <a:r>
-              <a:rPr lang="es-CO" sz="2000" dirty="0" err="1"/>
+              <a:rPr lang="es-CO" sz="2000" dirty="0" err="1" smtClean="0"/>
               <a:t>Github</a:t>
             </a:r>
             <a:r>
-              <a:rPr lang="es-CO" sz="2000" dirty="0"/>
+              <a:rPr lang="es-CO" sz="2000" dirty="0" smtClean="0"/>
               <a:t> Desktop</a:t>
             </a:r>
           </a:p>
@@ -6051,6 +6561,13 @@
   <p:clrMapOvr>
     <a:masterClrMapping/>
   </p:clrMapOvr>
+  <p:timing>
+    <p:tnLst>
+      <p:par>
+        <p:cTn id="1" dur="indefinite" restart="never" nodeType="tmRoot"/>
+      </p:par>
+    </p:tnLst>
+  </p:timing>
 </p:sld>
 </file>
 
@@ -6087,17 +6604,18 @@
           <a:lstStyle/>
           <a:p>
             <a:r>
-              <a:rPr lang="es-CO" dirty="0"/>
+              <a:rPr lang="es-CO" dirty="0" smtClean="0"/>
               <a:t>Qué es Web </a:t>
             </a:r>
             <a:r>
-              <a:rPr lang="es-CO" dirty="0" err="1"/>
+              <a:rPr lang="es-CO" dirty="0" err="1" smtClean="0"/>
               <a:t>Development</a:t>
             </a:r>
             <a:r>
-              <a:rPr lang="es-CO" dirty="0"/>
+              <a:rPr lang="es-CO" dirty="0" smtClean="0"/>
               <a:t>?</a:t>
             </a:r>
+            <a:endParaRPr lang="es-CO" dirty="0"/>
           </a:p>
         </p:txBody>
       </p:sp>
@@ -6124,7 +6642,7 @@
           <a:lstStyle/>
           <a:p>
             <a:r>
-              <a:rPr lang="es-CO" dirty="0"/>
+              <a:rPr lang="es-CO" dirty="0" smtClean="0"/>
               <a:t>Qué significa Web?</a:t>
             </a:r>
           </a:p>
@@ -6136,25 +6654,25 @@
           </a:p>
           <a:p>
             <a:r>
-              <a:rPr lang="es-CO" dirty="0"/>
+              <a:rPr lang="es-CO" dirty="0" smtClean="0"/>
               <a:t>Una aplicación Cliente Servidor es Web?</a:t>
             </a:r>
           </a:p>
           <a:p>
             <a:r>
-              <a:rPr lang="es-CO" dirty="0"/>
+              <a:rPr lang="es-CO" dirty="0" smtClean="0"/>
               <a:t>Podría ser mi Intranet una pagina Web?</a:t>
             </a:r>
           </a:p>
           <a:p>
             <a:r>
-              <a:rPr lang="es-CO" dirty="0"/>
+              <a:rPr lang="es-CO" dirty="0" smtClean="0"/>
               <a:t>Qué es un Sitio Web?</a:t>
             </a:r>
           </a:p>
           <a:p>
             <a:r>
-              <a:rPr lang="es-CO" dirty="0"/>
+              <a:rPr lang="es-CO" dirty="0" smtClean="0"/>
               <a:t>Que es un Portal Web?</a:t>
             </a:r>
           </a:p>
@@ -6525,11 +7043,11 @@
           <a:lstStyle/>
           <a:p>
             <a:r>
-              <a:rPr lang="es-CO" dirty="0"/>
+              <a:rPr lang="es-CO" dirty="0" smtClean="0"/>
               <a:t>Web </a:t>
             </a:r>
             <a:r>
-              <a:rPr lang="es-CO" dirty="0" err="1"/>
+              <a:rPr lang="es-CO" dirty="0" err="1" smtClean="0"/>
               <a:t>Development</a:t>
             </a:r>
             <a:endParaRPr lang="es-CO" dirty="0"/>
@@ -6559,11 +7077,11 @@
           <a:lstStyle/>
           <a:p>
             <a:r>
-              <a:rPr lang="es-CO" dirty="0"/>
+              <a:rPr lang="es-CO" dirty="0" smtClean="0"/>
               <a:t>Es la </a:t>
             </a:r>
             <a:r>
-              <a:rPr lang="es-CO" b="1" dirty="0">
+              <a:rPr lang="es-CO" b="1" dirty="0" smtClean="0">
                 <a:solidFill>
                   <a:schemeClr val="accent3"/>
                 </a:solidFill>
@@ -6571,7 +7089,7 @@
               <a:t>construcción</a:t>
             </a:r>
             <a:r>
-              <a:rPr lang="es-CO" dirty="0">
+              <a:rPr lang="es-CO" dirty="0" smtClean="0">
                 <a:solidFill>
                   <a:schemeClr val="accent3"/>
                 </a:solidFill>
@@ -6579,11 +7097,11 @@
               <a:t> </a:t>
             </a:r>
             <a:r>
-              <a:rPr lang="es-CO" dirty="0"/>
+              <a:rPr lang="es-CO" dirty="0" smtClean="0"/>
               <a:t>y </a:t>
             </a:r>
             <a:r>
-              <a:rPr lang="es-CO" b="1" dirty="0">
+              <a:rPr lang="es-CO" b="1" dirty="0" smtClean="0">
                 <a:solidFill>
                   <a:schemeClr val="bg1">
                     <a:lumMod val="50000"/>
@@ -6593,7 +7111,7 @@
               <a:t>mantenimiento</a:t>
             </a:r>
             <a:r>
-              <a:rPr lang="es-CO" dirty="0">
+              <a:rPr lang="es-CO" dirty="0" smtClean="0">
                 <a:solidFill>
                   <a:schemeClr val="bg1">
                     <a:lumMod val="50000"/>
@@ -6603,11 +7121,11 @@
               <a:t> </a:t>
             </a:r>
             <a:r>
-              <a:rPr lang="es-CO" dirty="0"/>
+              <a:rPr lang="es-CO" dirty="0" smtClean="0"/>
               <a:t>de </a:t>
             </a:r>
             <a:r>
-              <a:rPr lang="es-CO" b="1" dirty="0">
+              <a:rPr lang="es-CO" b="1" dirty="0" smtClean="0">
                 <a:solidFill>
                   <a:schemeClr val="accent1"/>
                 </a:solidFill>
@@ -6615,7 +7133,7 @@
               <a:t>aplicaciones</a:t>
             </a:r>
             <a:r>
-              <a:rPr lang="es-CO" dirty="0">
+              <a:rPr lang="es-CO" dirty="0" smtClean="0">
                 <a:solidFill>
                   <a:schemeClr val="accent1"/>
                 </a:solidFill>
@@ -6623,11 +7141,11 @@
               <a:t> </a:t>
             </a:r>
             <a:r>
-              <a:rPr lang="es-CO" dirty="0"/>
+              <a:rPr lang="es-CO" dirty="0" smtClean="0"/>
               <a:t>o </a:t>
             </a:r>
             <a:r>
-              <a:rPr lang="es-CO" b="1" dirty="0">
+              <a:rPr lang="es-CO" b="1" dirty="0" smtClean="0">
                 <a:solidFill>
                   <a:schemeClr val="bg2">
                     <a:lumMod val="50000"/>
@@ -6637,7 +7155,7 @@
               <a:t>sitios</a:t>
             </a:r>
             <a:r>
-              <a:rPr lang="es-CO" dirty="0">
+              <a:rPr lang="es-CO" dirty="0" smtClean="0">
                 <a:solidFill>
                   <a:schemeClr val="bg2">
                     <a:lumMod val="50000"/>
@@ -6647,7 +7165,7 @@
               <a:t> </a:t>
             </a:r>
             <a:r>
-              <a:rPr lang="es-CO" b="1" dirty="0">
+              <a:rPr lang="es-CO" b="1" dirty="0" smtClean="0">
                 <a:solidFill>
                   <a:srgbClr val="00B050"/>
                 </a:solidFill>
@@ -6655,11 +7173,11 @@
               <a:t>Web</a:t>
             </a:r>
             <a:r>
-              <a:rPr lang="es-CO" dirty="0"/>
+              <a:rPr lang="es-CO" dirty="0" smtClean="0"/>
               <a:t>, tanto para </a:t>
             </a:r>
             <a:r>
-              <a:rPr lang="es-CO" b="1" dirty="0">
+              <a:rPr lang="es-CO" b="1" dirty="0" smtClean="0">
                 <a:solidFill>
                   <a:schemeClr val="tx2"/>
                 </a:solidFill>
@@ -6667,7 +7185,7 @@
               <a:t>Internet</a:t>
             </a:r>
             <a:r>
-              <a:rPr lang="es-CO" dirty="0">
+              <a:rPr lang="es-CO" dirty="0" smtClean="0">
                 <a:solidFill>
                   <a:schemeClr val="tx2"/>
                 </a:solidFill>
@@ -6675,11 +7193,11 @@
               <a:t> </a:t>
             </a:r>
             <a:r>
-              <a:rPr lang="es-CO" dirty="0"/>
+              <a:rPr lang="es-CO" dirty="0" smtClean="0"/>
               <a:t>o </a:t>
             </a:r>
             <a:r>
-              <a:rPr lang="es-CO" b="1" dirty="0">
+              <a:rPr lang="es-CO" b="1" dirty="0" smtClean="0">
                 <a:solidFill>
                   <a:schemeClr val="accent2"/>
                 </a:solidFill>
@@ -6687,11 +7205,11 @@
               <a:t>Intranet</a:t>
             </a:r>
             <a:r>
-              <a:rPr lang="es-CO" dirty="0"/>
+              <a:rPr lang="es-CO" dirty="0" smtClean="0"/>
               <a:t>, que involucra la interacción de </a:t>
             </a:r>
             <a:r>
-              <a:rPr lang="es-CO" b="1" dirty="0">
+              <a:rPr lang="es-CO" b="1" dirty="0" smtClean="0">
                 <a:solidFill>
                   <a:srgbClr val="FFC000"/>
                 </a:solidFill>
@@ -6699,7 +7217,7 @@
               <a:t>componentes</a:t>
             </a:r>
             <a:r>
-              <a:rPr lang="es-CO" dirty="0">
+              <a:rPr lang="es-CO" dirty="0" smtClean="0">
                 <a:solidFill>
                   <a:srgbClr val="FFC000"/>
                 </a:solidFill>
@@ -6707,11 +7225,11 @@
               <a:t> </a:t>
             </a:r>
             <a:r>
-              <a:rPr lang="es-CO" dirty="0"/>
+              <a:rPr lang="es-CO" dirty="0" smtClean="0"/>
               <a:t>de </a:t>
             </a:r>
             <a:r>
-              <a:rPr lang="es-CO" b="1" dirty="0">
+              <a:rPr lang="es-CO" b="1" dirty="0" smtClean="0">
                 <a:solidFill>
                   <a:schemeClr val="accent6"/>
                 </a:solidFill>
@@ -6719,7 +7237,7 @@
               <a:t>Front</a:t>
             </a:r>
             <a:r>
-              <a:rPr lang="es-CO" dirty="0">
+              <a:rPr lang="es-CO" dirty="0" smtClean="0">
                 <a:solidFill>
                   <a:schemeClr val="accent6"/>
                 </a:solidFill>
@@ -6727,11 +7245,11 @@
               <a:t> </a:t>
             </a:r>
             <a:r>
-              <a:rPr lang="es-CO" dirty="0"/>
+              <a:rPr lang="es-CO" dirty="0" smtClean="0"/>
               <a:t>con servicios de </a:t>
             </a:r>
             <a:r>
-              <a:rPr lang="es-CO" b="1" dirty="0">
+              <a:rPr lang="es-CO" b="1" dirty="0" smtClean="0">
                 <a:solidFill>
                   <a:srgbClr val="7030A0"/>
                 </a:solidFill>
@@ -6739,7 +7257,7 @@
               <a:t>Back</a:t>
             </a:r>
             <a:r>
-              <a:rPr lang="es-CO" dirty="0"/>
+              <a:rPr lang="es-CO" dirty="0" smtClean="0"/>
               <a:t>.</a:t>
             </a:r>
           </a:p>
@@ -6796,6 +7314,13 @@
   <p:clrMapOvr>
     <a:masterClrMapping/>
   </p:clrMapOvr>
+  <p:timing>
+    <p:tnLst>
+      <p:par>
+        <p:cTn id="1" dur="indefinite" restart="never" nodeType="tmRoot"/>
+      </p:par>
+    </p:tnLst>
+  </p:timing>
 </p:sld>
 </file>
 

</xml_diff>